<commit_message>
New data and analysis scripts
</commit_message>
<xml_diff>
--- a/Design/Design.pptx
+++ b/Design/Design.pptx
@@ -5,7 +5,7 @@
     <p:sldMasterId id="2147483648" r:id="rId1"/>
   </p:sldMasterIdLst>
   <p:sldIdLst>
-    <p:sldId id="257" r:id="rId2"/>
+    <p:sldId id="256" r:id="rId2"/>
   </p:sldIdLst>
   <p:sldSz cx="9144000" cy="6858000" type="screen4x3"/>
   <p:notesSz cx="6858000" cy="9144000"/>
@@ -104,6 +104,22 @@
       </a:defRPr>
     </a:lvl9pPr>
   </p:defaultTextStyle>
+  <p:extLst>
+    <p:ext uri="{EFAFB233-063F-42B5-8137-9DF3F51BA10A}">
+      <p15:sldGuideLst xmlns:p15="http://schemas.microsoft.com/office/powerpoint/2012/main">
+        <p15:guide id="1" orient="horz" pos="2160">
+          <p15:clr>
+            <a:srgbClr val="A4A3A4"/>
+          </p15:clr>
+        </p15:guide>
+        <p15:guide id="2" pos="2880">
+          <p15:clr>
+            <a:srgbClr val="A4A3A4"/>
+          </p15:clr>
+        </p15:guide>
+      </p15:sldGuideLst>
+    </p:ext>
+  </p:extLst>
 </p:presentation>
 </file>
 
@@ -286,10 +302,9 @@
           <a:bodyPr/>
           <a:lstStyle/>
           <a:p>
-            <a:fld id="{F240EA99-52CB-4DB3-9950-29EE89FCB55F}" type="datetimeFigureOut">
-              <a:rPr lang="nl-NL" smtClean="0"/>
-              <a:pPr/>
-              <a:t>28-5-2015</a:t>
+            <a:fld id="{2CE24809-4982-4D67-9B7F-44EF26B130BF}" type="datetimeFigureOut">
+              <a:rPr lang="nl-NL" smtClean="0"/>
+              <a:t>3-2-2016</a:t>
             </a:fld>
             <a:endParaRPr lang="nl-NL"/>
           </a:p>
@@ -329,10 +344,9 @@
           <a:bodyPr/>
           <a:lstStyle/>
           <a:p>
-            <a:fld id="{88F3E5FA-1CDE-4248-A452-AC30CBB924D8}" type="slidenum">
-              <a:rPr lang="nl-NL" smtClean="0"/>
-              <a:pPr/>
-              <a:t>‹nr.›</a:t>
+            <a:fld id="{1B9431A0-2395-41DA-AF87-7221BFDE0E82}" type="slidenum">
+              <a:rPr lang="nl-NL" smtClean="0"/>
+              <a:t>‹#›</a:t>
             </a:fld>
             <a:endParaRPr lang="nl-NL"/>
           </a:p>
@@ -453,10 +467,9 @@
           <a:bodyPr/>
           <a:lstStyle/>
           <a:p>
-            <a:fld id="{F240EA99-52CB-4DB3-9950-29EE89FCB55F}" type="datetimeFigureOut">
-              <a:rPr lang="nl-NL" smtClean="0"/>
-              <a:pPr/>
-              <a:t>28-5-2015</a:t>
+            <a:fld id="{2CE24809-4982-4D67-9B7F-44EF26B130BF}" type="datetimeFigureOut">
+              <a:rPr lang="nl-NL" smtClean="0"/>
+              <a:t>3-2-2016</a:t>
             </a:fld>
             <a:endParaRPr lang="nl-NL"/>
           </a:p>
@@ -496,10 +509,9 @@
           <a:bodyPr/>
           <a:lstStyle/>
           <a:p>
-            <a:fld id="{88F3E5FA-1CDE-4248-A452-AC30CBB924D8}" type="slidenum">
-              <a:rPr lang="nl-NL" smtClean="0"/>
-              <a:pPr/>
-              <a:t>‹nr.›</a:t>
+            <a:fld id="{1B9431A0-2395-41DA-AF87-7221BFDE0E82}" type="slidenum">
+              <a:rPr lang="nl-NL" smtClean="0"/>
+              <a:t>‹#›</a:t>
             </a:fld>
             <a:endParaRPr lang="nl-NL"/>
           </a:p>
@@ -630,10 +642,9 @@
           <a:bodyPr/>
           <a:lstStyle/>
           <a:p>
-            <a:fld id="{F240EA99-52CB-4DB3-9950-29EE89FCB55F}" type="datetimeFigureOut">
-              <a:rPr lang="nl-NL" smtClean="0"/>
-              <a:pPr/>
-              <a:t>28-5-2015</a:t>
+            <a:fld id="{2CE24809-4982-4D67-9B7F-44EF26B130BF}" type="datetimeFigureOut">
+              <a:rPr lang="nl-NL" smtClean="0"/>
+              <a:t>3-2-2016</a:t>
             </a:fld>
             <a:endParaRPr lang="nl-NL"/>
           </a:p>
@@ -673,10 +684,9 @@
           <a:bodyPr/>
           <a:lstStyle/>
           <a:p>
-            <a:fld id="{88F3E5FA-1CDE-4248-A452-AC30CBB924D8}" type="slidenum">
-              <a:rPr lang="nl-NL" smtClean="0"/>
-              <a:pPr/>
-              <a:t>‹nr.›</a:t>
+            <a:fld id="{1B9431A0-2395-41DA-AF87-7221BFDE0E82}" type="slidenum">
+              <a:rPr lang="nl-NL" smtClean="0"/>
+              <a:t>‹#›</a:t>
             </a:fld>
             <a:endParaRPr lang="nl-NL"/>
           </a:p>
@@ -797,10 +807,9 @@
           <a:bodyPr/>
           <a:lstStyle/>
           <a:p>
-            <a:fld id="{F240EA99-52CB-4DB3-9950-29EE89FCB55F}" type="datetimeFigureOut">
-              <a:rPr lang="nl-NL" smtClean="0"/>
-              <a:pPr/>
-              <a:t>28-5-2015</a:t>
+            <a:fld id="{2CE24809-4982-4D67-9B7F-44EF26B130BF}" type="datetimeFigureOut">
+              <a:rPr lang="nl-NL" smtClean="0"/>
+              <a:t>3-2-2016</a:t>
             </a:fld>
             <a:endParaRPr lang="nl-NL"/>
           </a:p>
@@ -840,10 +849,9 @@
           <a:bodyPr/>
           <a:lstStyle/>
           <a:p>
-            <a:fld id="{88F3E5FA-1CDE-4248-A452-AC30CBB924D8}" type="slidenum">
-              <a:rPr lang="nl-NL" smtClean="0"/>
-              <a:pPr/>
-              <a:t>‹nr.›</a:t>
+            <a:fld id="{1B9431A0-2395-41DA-AF87-7221BFDE0E82}" type="slidenum">
+              <a:rPr lang="nl-NL" smtClean="0"/>
+              <a:t>‹#›</a:t>
             </a:fld>
             <a:endParaRPr lang="nl-NL"/>
           </a:p>
@@ -1040,10 +1048,9 @@
           <a:bodyPr/>
           <a:lstStyle/>
           <a:p>
-            <a:fld id="{F240EA99-52CB-4DB3-9950-29EE89FCB55F}" type="datetimeFigureOut">
-              <a:rPr lang="nl-NL" smtClean="0"/>
-              <a:pPr/>
-              <a:t>28-5-2015</a:t>
+            <a:fld id="{2CE24809-4982-4D67-9B7F-44EF26B130BF}" type="datetimeFigureOut">
+              <a:rPr lang="nl-NL" smtClean="0"/>
+              <a:t>3-2-2016</a:t>
             </a:fld>
             <a:endParaRPr lang="nl-NL"/>
           </a:p>
@@ -1083,10 +1090,9 @@
           <a:bodyPr/>
           <a:lstStyle/>
           <a:p>
-            <a:fld id="{88F3E5FA-1CDE-4248-A452-AC30CBB924D8}" type="slidenum">
-              <a:rPr lang="nl-NL" smtClean="0"/>
-              <a:pPr/>
-              <a:t>‹nr.›</a:t>
+            <a:fld id="{1B9431A0-2395-41DA-AF87-7221BFDE0E82}" type="slidenum">
+              <a:rPr lang="nl-NL" smtClean="0"/>
+              <a:t>‹#›</a:t>
             </a:fld>
             <a:endParaRPr lang="nl-NL"/>
           </a:p>
@@ -1325,10 +1331,9 @@
           <a:bodyPr/>
           <a:lstStyle/>
           <a:p>
-            <a:fld id="{F240EA99-52CB-4DB3-9950-29EE89FCB55F}" type="datetimeFigureOut">
-              <a:rPr lang="nl-NL" smtClean="0"/>
-              <a:pPr/>
-              <a:t>28-5-2015</a:t>
+            <a:fld id="{2CE24809-4982-4D67-9B7F-44EF26B130BF}" type="datetimeFigureOut">
+              <a:rPr lang="nl-NL" smtClean="0"/>
+              <a:t>3-2-2016</a:t>
             </a:fld>
             <a:endParaRPr lang="nl-NL"/>
           </a:p>
@@ -1368,10 +1373,9 @@
           <a:bodyPr/>
           <a:lstStyle/>
           <a:p>
-            <a:fld id="{88F3E5FA-1CDE-4248-A452-AC30CBB924D8}" type="slidenum">
-              <a:rPr lang="nl-NL" smtClean="0"/>
-              <a:pPr/>
-              <a:t>‹nr.›</a:t>
+            <a:fld id="{1B9431A0-2395-41DA-AF87-7221BFDE0E82}" type="slidenum">
+              <a:rPr lang="nl-NL" smtClean="0"/>
+              <a:t>‹#›</a:t>
             </a:fld>
             <a:endParaRPr lang="nl-NL"/>
           </a:p>
@@ -1744,10 +1748,9 @@
           <a:bodyPr/>
           <a:lstStyle/>
           <a:p>
-            <a:fld id="{F240EA99-52CB-4DB3-9950-29EE89FCB55F}" type="datetimeFigureOut">
-              <a:rPr lang="nl-NL" smtClean="0"/>
-              <a:pPr/>
-              <a:t>28-5-2015</a:t>
+            <a:fld id="{2CE24809-4982-4D67-9B7F-44EF26B130BF}" type="datetimeFigureOut">
+              <a:rPr lang="nl-NL" smtClean="0"/>
+              <a:t>3-2-2016</a:t>
             </a:fld>
             <a:endParaRPr lang="nl-NL"/>
           </a:p>
@@ -1787,10 +1790,9 @@
           <a:bodyPr/>
           <a:lstStyle/>
           <a:p>
-            <a:fld id="{88F3E5FA-1CDE-4248-A452-AC30CBB924D8}" type="slidenum">
-              <a:rPr lang="nl-NL" smtClean="0"/>
-              <a:pPr/>
-              <a:t>‹nr.›</a:t>
+            <a:fld id="{1B9431A0-2395-41DA-AF87-7221BFDE0E82}" type="slidenum">
+              <a:rPr lang="nl-NL" smtClean="0"/>
+              <a:t>‹#›</a:t>
             </a:fld>
             <a:endParaRPr lang="nl-NL"/>
           </a:p>
@@ -1859,10 +1861,9 @@
           <a:bodyPr/>
           <a:lstStyle/>
           <a:p>
-            <a:fld id="{F240EA99-52CB-4DB3-9950-29EE89FCB55F}" type="datetimeFigureOut">
-              <a:rPr lang="nl-NL" smtClean="0"/>
-              <a:pPr/>
-              <a:t>28-5-2015</a:t>
+            <a:fld id="{2CE24809-4982-4D67-9B7F-44EF26B130BF}" type="datetimeFigureOut">
+              <a:rPr lang="nl-NL" smtClean="0"/>
+              <a:t>3-2-2016</a:t>
             </a:fld>
             <a:endParaRPr lang="nl-NL"/>
           </a:p>
@@ -1902,10 +1903,9 @@
           <a:bodyPr/>
           <a:lstStyle/>
           <a:p>
-            <a:fld id="{88F3E5FA-1CDE-4248-A452-AC30CBB924D8}" type="slidenum">
-              <a:rPr lang="nl-NL" smtClean="0"/>
-              <a:pPr/>
-              <a:t>‹nr.›</a:t>
+            <a:fld id="{1B9431A0-2395-41DA-AF87-7221BFDE0E82}" type="slidenum">
+              <a:rPr lang="nl-NL" smtClean="0"/>
+              <a:t>‹#›</a:t>
             </a:fld>
             <a:endParaRPr lang="nl-NL"/>
           </a:p>
@@ -1951,10 +1951,9 @@
           <a:bodyPr/>
           <a:lstStyle/>
           <a:p>
-            <a:fld id="{F240EA99-52CB-4DB3-9950-29EE89FCB55F}" type="datetimeFigureOut">
-              <a:rPr lang="nl-NL" smtClean="0"/>
-              <a:pPr/>
-              <a:t>28-5-2015</a:t>
+            <a:fld id="{2CE24809-4982-4D67-9B7F-44EF26B130BF}" type="datetimeFigureOut">
+              <a:rPr lang="nl-NL" smtClean="0"/>
+              <a:t>3-2-2016</a:t>
             </a:fld>
             <a:endParaRPr lang="nl-NL"/>
           </a:p>
@@ -1994,10 +1993,9 @@
           <a:bodyPr/>
           <a:lstStyle/>
           <a:p>
-            <a:fld id="{88F3E5FA-1CDE-4248-A452-AC30CBB924D8}" type="slidenum">
-              <a:rPr lang="nl-NL" smtClean="0"/>
-              <a:pPr/>
-              <a:t>‹nr.›</a:t>
+            <a:fld id="{1B9431A0-2395-41DA-AF87-7221BFDE0E82}" type="slidenum">
+              <a:rPr lang="nl-NL" smtClean="0"/>
+              <a:t>‹#›</a:t>
             </a:fld>
             <a:endParaRPr lang="nl-NL"/>
           </a:p>
@@ -2225,10 +2223,9 @@
           <a:bodyPr/>
           <a:lstStyle/>
           <a:p>
-            <a:fld id="{F240EA99-52CB-4DB3-9950-29EE89FCB55F}" type="datetimeFigureOut">
-              <a:rPr lang="nl-NL" smtClean="0"/>
-              <a:pPr/>
-              <a:t>28-5-2015</a:t>
+            <a:fld id="{2CE24809-4982-4D67-9B7F-44EF26B130BF}" type="datetimeFigureOut">
+              <a:rPr lang="nl-NL" smtClean="0"/>
+              <a:t>3-2-2016</a:t>
             </a:fld>
             <a:endParaRPr lang="nl-NL"/>
           </a:p>
@@ -2268,10 +2265,9 @@
           <a:bodyPr/>
           <a:lstStyle/>
           <a:p>
-            <a:fld id="{88F3E5FA-1CDE-4248-A452-AC30CBB924D8}" type="slidenum">
-              <a:rPr lang="nl-NL" smtClean="0"/>
-              <a:pPr/>
-              <a:t>‹nr.›</a:t>
+            <a:fld id="{1B9431A0-2395-41DA-AF87-7221BFDE0E82}" type="slidenum">
+              <a:rPr lang="nl-NL" smtClean="0"/>
+              <a:t>‹#›</a:t>
             </a:fld>
             <a:endParaRPr lang="nl-NL"/>
           </a:p>
@@ -2475,10 +2471,9 @@
           <a:bodyPr/>
           <a:lstStyle/>
           <a:p>
-            <a:fld id="{F240EA99-52CB-4DB3-9950-29EE89FCB55F}" type="datetimeFigureOut">
-              <a:rPr lang="nl-NL" smtClean="0"/>
-              <a:pPr/>
-              <a:t>28-5-2015</a:t>
+            <a:fld id="{2CE24809-4982-4D67-9B7F-44EF26B130BF}" type="datetimeFigureOut">
+              <a:rPr lang="nl-NL" smtClean="0"/>
+              <a:t>3-2-2016</a:t>
             </a:fld>
             <a:endParaRPr lang="nl-NL"/>
           </a:p>
@@ -2518,10 +2513,9 @@
           <a:bodyPr/>
           <a:lstStyle/>
           <a:p>
-            <a:fld id="{88F3E5FA-1CDE-4248-A452-AC30CBB924D8}" type="slidenum">
-              <a:rPr lang="nl-NL" smtClean="0"/>
-              <a:pPr/>
-              <a:t>‹nr.›</a:t>
+            <a:fld id="{1B9431A0-2395-41DA-AF87-7221BFDE0E82}" type="slidenum">
+              <a:rPr lang="nl-NL" smtClean="0"/>
+              <a:t>‹#›</a:t>
             </a:fld>
             <a:endParaRPr lang="nl-NL"/>
           </a:p>
@@ -2685,10 +2679,9 @@
             </a:lvl1pPr>
           </a:lstStyle>
           <a:p>
-            <a:fld id="{F240EA99-52CB-4DB3-9950-29EE89FCB55F}" type="datetimeFigureOut">
-              <a:rPr lang="nl-NL" smtClean="0"/>
-              <a:pPr/>
-              <a:t>28-5-2015</a:t>
+            <a:fld id="{2CE24809-4982-4D67-9B7F-44EF26B130BF}" type="datetimeFigureOut">
+              <a:rPr lang="nl-NL" smtClean="0"/>
+              <a:t>3-2-2016</a:t>
             </a:fld>
             <a:endParaRPr lang="nl-NL"/>
           </a:p>
@@ -2764,10 +2757,9 @@
             </a:lvl1pPr>
           </a:lstStyle>
           <a:p>
-            <a:fld id="{88F3E5FA-1CDE-4248-A452-AC30CBB924D8}" type="slidenum">
-              <a:rPr lang="nl-NL" smtClean="0"/>
-              <a:pPr/>
-              <a:t>‹nr.›</a:t>
+            <a:fld id="{1B9431A0-2395-41DA-AF87-7221BFDE0E82}" type="slidenum">
+              <a:rPr lang="nl-NL" smtClean="0"/>
+              <a:t>‹#›</a:t>
             </a:fld>
             <a:endParaRPr lang="nl-NL"/>
           </a:p>
@@ -3059,276 +3051,138 @@
           <a:chExt cx="0" cy="0"/>
         </a:xfrm>
       </p:grpSpPr>
+      <p:sp>
+        <p:nvSpPr>
+          <p:cNvPr id="4" name="Titel 3"/>
+          <p:cNvSpPr>
+            <a:spLocks noGrp="1"/>
+          </p:cNvSpPr>
+          <p:nvPr>
+            <p:ph type="title"/>
+          </p:nvPr>
+        </p:nvSpPr>
+        <p:spPr/>
+        <p:txBody>
+          <a:bodyPr>
+            <a:normAutofit/>
+          </a:bodyPr>
+          <a:lstStyle/>
+          <a:p>
+            <a:r>
+              <a:rPr lang="en-US" sz="3600" dirty="0" err="1" smtClean="0">
+                <a:latin typeface="Lucida Sans Unicode" pitchFamily="34" charset="0"/>
+                <a:cs typeface="Lucida Sans Unicode" pitchFamily="34" charset="0"/>
+              </a:rPr>
+              <a:t>SWM_pupil</a:t>
+            </a:r>
+            <a:r>
+              <a:rPr lang="en-US" sz="3600" dirty="0" smtClean="0">
+                <a:latin typeface="Lucida Sans Unicode" pitchFamily="34" charset="0"/>
+                <a:cs typeface="Lucida Sans Unicode" pitchFamily="34" charset="0"/>
+              </a:rPr>
+              <a:t> trial</a:t>
+            </a:r>
+            <a:endParaRPr lang="nl-NL" sz="3600" dirty="0">
+              <a:latin typeface="Lucida Sans Unicode" pitchFamily="34" charset="0"/>
+              <a:cs typeface="Lucida Sans Unicode" pitchFamily="34" charset="0"/>
+            </a:endParaRPr>
+          </a:p>
+        </p:txBody>
+      </p:sp>
       <p:grpSp>
         <p:nvGrpSpPr>
-          <p:cNvPr id="70" name="Groep 69"/>
+          <p:cNvPr id="14" name="Groep 13"/>
           <p:cNvGrpSpPr/>
           <p:nvPr/>
         </p:nvGrpSpPr>
         <p:grpSpPr>
           <a:xfrm>
-            <a:off x="179511" y="260648"/>
-            <a:ext cx="8822429" cy="5328592"/>
-            <a:chOff x="755576" y="188640"/>
-            <a:chExt cx="8136904" cy="4914547"/>
+            <a:off x="0" y="764704"/>
+            <a:ext cx="2304256" cy="2160240"/>
+            <a:chOff x="539552" y="1556792"/>
+            <a:chExt cx="2304256" cy="2160240"/>
           </a:xfrm>
         </p:grpSpPr>
+        <p:sp>
+          <p:nvSpPr>
+            <p:cNvPr id="15" name="Rechthoek 14"/>
+            <p:cNvSpPr/>
+            <p:nvPr/>
+          </p:nvSpPr>
+          <p:spPr>
+            <a:xfrm>
+              <a:off x="539552" y="1556792"/>
+              <a:ext cx="2304256" cy="2160240"/>
+            </a:xfrm>
+            <a:prstGeom prst="rect">
+              <a:avLst/>
+            </a:prstGeom>
+            <a:solidFill>
+              <a:schemeClr val="bg1">
+                <a:lumMod val="50000"/>
+              </a:schemeClr>
+            </a:solidFill>
+            <a:ln>
+              <a:solidFill>
+                <a:schemeClr val="tx1"/>
+              </a:solidFill>
+            </a:ln>
+          </p:spPr>
+          <p:style>
+            <a:lnRef idx="2">
+              <a:schemeClr val="accent1">
+                <a:shade val="50000"/>
+              </a:schemeClr>
+            </a:lnRef>
+            <a:fillRef idx="1">
+              <a:schemeClr val="accent1"/>
+            </a:fillRef>
+            <a:effectRef idx="0">
+              <a:schemeClr val="accent1"/>
+            </a:effectRef>
+            <a:fontRef idx="minor">
+              <a:schemeClr val="lt1"/>
+            </a:fontRef>
+          </p:style>
+          <p:txBody>
+            <a:bodyPr rtlCol="0" anchor="ctr"/>
+            <a:lstStyle/>
+            <a:p>
+              <a:pPr algn="ctr"/>
+              <a:endParaRPr lang="nl-NL"/>
+            </a:p>
+          </p:txBody>
+        </p:sp>
         <p:grpSp>
           <p:nvGrpSpPr>
-            <p:cNvPr id="58" name="Groep 57"/>
+            <p:cNvPr id="16" name="Groep 10"/>
             <p:cNvGrpSpPr/>
             <p:nvPr/>
           </p:nvGrpSpPr>
           <p:grpSpPr>
             <a:xfrm>
-              <a:off x="755576" y="188640"/>
-              <a:ext cx="1512168" cy="1719395"/>
-              <a:chOff x="6442235" y="116632"/>
-              <a:chExt cx="2288988" cy="2602670"/>
+              <a:off x="683568" y="1628800"/>
+              <a:ext cx="2016224" cy="2016224"/>
+              <a:chOff x="3347864" y="3645024"/>
+              <a:chExt cx="2016224" cy="2016224"/>
             </a:xfrm>
           </p:grpSpPr>
-          <p:grpSp>
-            <p:nvGrpSpPr>
-              <p:cNvPr id="61" name="Groep 78"/>
-              <p:cNvGrpSpPr/>
-              <p:nvPr/>
-            </p:nvGrpSpPr>
-            <p:grpSpPr>
-              <a:xfrm>
-                <a:off x="6442235" y="116632"/>
-                <a:ext cx="2288988" cy="2602670"/>
-                <a:chOff x="6082195" y="116632"/>
-                <a:chExt cx="2288988" cy="2602670"/>
-              </a:xfrm>
-            </p:grpSpPr>
-            <p:sp>
-              <p:nvSpPr>
-                <p:cNvPr id="63" name="Rechthoek 62"/>
-                <p:cNvSpPr/>
-                <p:nvPr/>
-              </p:nvSpPr>
-              <p:spPr>
-                <a:xfrm>
-                  <a:off x="6300192" y="116632"/>
-                  <a:ext cx="936104" cy="1872208"/>
-                </a:xfrm>
-                <a:prstGeom prst="rect">
-                  <a:avLst/>
-                </a:prstGeom>
-                <a:solidFill>
-                  <a:schemeClr val="tx1">
-                    <a:lumMod val="85000"/>
-                    <a:lumOff val="15000"/>
-                  </a:schemeClr>
-                </a:solidFill>
-                <a:ln>
-                  <a:noFill/>
-                </a:ln>
-              </p:spPr>
-              <p:style>
-                <a:lnRef idx="2">
-                  <a:schemeClr val="accent1">
-                    <a:shade val="50000"/>
-                  </a:schemeClr>
-                </a:lnRef>
-                <a:fillRef idx="1">
-                  <a:schemeClr val="accent1"/>
-                </a:fillRef>
-                <a:effectRef idx="0">
-                  <a:schemeClr val="accent1"/>
-                </a:effectRef>
-                <a:fontRef idx="minor">
-                  <a:schemeClr val="lt1"/>
-                </a:fontRef>
-              </p:style>
-              <p:txBody>
-                <a:bodyPr rtlCol="0" anchor="ctr"/>
-                <a:lstStyle/>
-                <a:p>
-                  <a:pPr algn="ctr"/>
-                  <a:endParaRPr lang="nl-NL"/>
-                </a:p>
-              </p:txBody>
-            </p:sp>
-            <p:grpSp>
-              <p:nvGrpSpPr>
-                <p:cNvPr id="64" name="Groep 49"/>
-                <p:cNvGrpSpPr/>
-                <p:nvPr/>
-              </p:nvGrpSpPr>
-              <p:grpSpPr>
-                <a:xfrm>
-                  <a:off x="6082195" y="116632"/>
-                  <a:ext cx="2288988" cy="2602670"/>
-                  <a:chOff x="2049747" y="116632"/>
-                  <a:chExt cx="2288988" cy="2602670"/>
-                </a:xfrm>
-              </p:grpSpPr>
-              <p:grpSp>
-                <p:nvGrpSpPr>
-                  <p:cNvPr id="65" name="Groep 35"/>
-                  <p:cNvGrpSpPr/>
-                  <p:nvPr/>
-                </p:nvGrpSpPr>
-                <p:grpSpPr>
-                  <a:xfrm>
-                    <a:off x="2267744" y="116632"/>
-                    <a:ext cx="1872208" cy="1872208"/>
-                    <a:chOff x="547936" y="485056"/>
-                    <a:chExt cx="2592288" cy="2592288"/>
-                  </a:xfrm>
-                </p:grpSpPr>
-                <p:sp>
-                  <p:nvSpPr>
-                    <p:cNvPr id="67" name="Rechthoek 66"/>
-                    <p:cNvSpPr/>
-                    <p:nvPr/>
-                  </p:nvSpPr>
-                  <p:spPr>
-                    <a:xfrm>
-                      <a:off x="547936" y="485056"/>
-                      <a:ext cx="2592288" cy="2592288"/>
-                    </a:xfrm>
-                    <a:prstGeom prst="rect">
-                      <a:avLst/>
-                    </a:prstGeom>
-                    <a:noFill/>
-                    <a:ln w="12700">
-                      <a:solidFill>
-                        <a:schemeClr val="tx1"/>
-                      </a:solidFill>
-                    </a:ln>
-                  </p:spPr>
-                  <p:style>
-                    <a:lnRef idx="2">
-                      <a:schemeClr val="accent1">
-                        <a:shade val="50000"/>
-                      </a:schemeClr>
-                    </a:lnRef>
-                    <a:fillRef idx="1">
-                      <a:schemeClr val="accent1"/>
-                    </a:fillRef>
-                    <a:effectRef idx="0">
-                      <a:schemeClr val="accent1"/>
-                    </a:effectRef>
-                    <a:fontRef idx="minor">
-                      <a:schemeClr val="lt1"/>
-                    </a:fontRef>
-                  </p:style>
-                  <p:txBody>
-                    <a:bodyPr rtlCol="0" anchor="ctr"/>
-                    <a:lstStyle/>
-                    <a:p>
-                      <a:pPr algn="ctr"/>
-                      <a:endParaRPr lang="nl-NL" sz="1400"/>
-                    </a:p>
-                  </p:txBody>
-                </p:sp>
-                <p:sp>
-                  <p:nvSpPr>
-                    <p:cNvPr id="68" name="Ovaal 67"/>
-                    <p:cNvSpPr/>
-                    <p:nvPr/>
-                  </p:nvSpPr>
-                  <p:spPr>
-                    <a:xfrm>
-                      <a:off x="691952" y="629072"/>
-                      <a:ext cx="2304256" cy="2304256"/>
-                    </a:xfrm>
-                    <a:prstGeom prst="ellipse">
-                      <a:avLst/>
-                    </a:prstGeom>
-                    <a:noFill/>
-                    <a:ln w="9525">
-                      <a:solidFill>
-                        <a:schemeClr val="tx1"/>
-                      </a:solidFill>
-                      <a:prstDash val="lgDash"/>
-                    </a:ln>
-                  </p:spPr>
-                  <p:style>
-                    <a:lnRef idx="2">
-                      <a:schemeClr val="accent1">
-                        <a:shade val="50000"/>
-                      </a:schemeClr>
-                    </a:lnRef>
-                    <a:fillRef idx="1">
-                      <a:schemeClr val="accent1"/>
-                    </a:fillRef>
-                    <a:effectRef idx="0">
-                      <a:schemeClr val="accent1"/>
-                    </a:effectRef>
-                    <a:fontRef idx="minor">
-                      <a:schemeClr val="lt1"/>
-                    </a:fontRef>
-                  </p:style>
-                  <p:txBody>
-                    <a:bodyPr rtlCol="0" anchor="ctr"/>
-                    <a:lstStyle/>
-                    <a:p>
-                      <a:pPr algn="ctr"/>
-                      <a:endParaRPr lang="nl-NL" sz="1400"/>
-                    </a:p>
-                  </p:txBody>
-                </p:sp>
-              </p:grpSp>
-              <p:sp>
-                <p:nvSpPr>
-                  <p:cNvPr id="66" name="Tekstvak 65"/>
-                  <p:cNvSpPr txBox="1"/>
-                  <p:nvPr/>
-                </p:nvSpPr>
-                <p:spPr>
-                  <a:xfrm>
-                    <a:off x="2049747" y="1988838"/>
-                    <a:ext cx="2288988" cy="730464"/>
-                  </a:xfrm>
-                  <a:prstGeom prst="rect">
-                    <a:avLst/>
-                  </a:prstGeom>
-                  <a:noFill/>
-                </p:spPr>
-                <p:txBody>
-                  <a:bodyPr wrap="square" rtlCol="0">
-                    <a:spAutoFit/>
-                  </a:bodyPr>
-                  <a:lstStyle/>
-                  <a:p>
-                    <a:pPr algn="ctr"/>
-                    <a:r>
-                      <a:rPr lang="en-US" sz="1400" dirty="0" smtClean="0"/>
-                      <a:t>1</a:t>
-                    </a:r>
-                    <a:r>
-                      <a:rPr lang="en-US" sz="1400" dirty="0" smtClean="0"/>
-                      <a:t>. Fixation</a:t>
-                    </a:r>
-                  </a:p>
-                  <a:p>
-                    <a:pPr algn="ctr"/>
-                    <a:r>
-                      <a:rPr lang="en-US" sz="1400" dirty="0" smtClean="0"/>
-                      <a:t>(500-1500 ms)</a:t>
-                    </a:r>
-                    <a:endParaRPr lang="nl-NL" sz="1400" dirty="0"/>
-                  </a:p>
-                </p:txBody>
-              </p:sp>
-            </p:grpSp>
-          </p:grpSp>
           <p:sp>
             <p:nvSpPr>
-              <p:cNvPr id="62" name="Ovaal 61"/>
+              <p:cNvPr id="19" name="Koorde 18"/>
               <p:cNvSpPr/>
               <p:nvPr/>
             </p:nvSpPr>
             <p:spPr>
               <a:xfrm>
-                <a:off x="7542000" y="1000800"/>
-                <a:ext cx="104012" cy="104012"/>
+                <a:off x="3347864" y="3645024"/>
+                <a:ext cx="2016224" cy="2016224"/>
               </a:xfrm>
-              <a:prstGeom prst="ellipse">
-                <a:avLst/>
+              <a:prstGeom prst="chord">
+                <a:avLst>
+                  <a:gd name="adj1" fmla="val 5387812"/>
+                  <a:gd name="adj2" fmla="val 16200000"/>
+                </a:avLst>
               </a:prstGeom>
               <a:solidFill>
                 <a:schemeClr val="tx1"/>
@@ -3362,313 +3216,368 @@
               </a:p>
             </p:txBody>
           </p:sp>
+          <p:sp>
+            <p:nvSpPr>
+              <p:cNvPr id="20" name="Koorde 19"/>
+              <p:cNvSpPr/>
+              <p:nvPr/>
+            </p:nvSpPr>
+            <p:spPr>
+              <a:xfrm rot="10800000">
+                <a:off x="3347864" y="3645024"/>
+                <a:ext cx="2016224" cy="2016224"/>
+              </a:xfrm>
+              <a:prstGeom prst="chord">
+                <a:avLst>
+                  <a:gd name="adj1" fmla="val 5387812"/>
+                  <a:gd name="adj2" fmla="val 16200000"/>
+                </a:avLst>
+              </a:prstGeom>
+              <a:solidFill>
+                <a:schemeClr val="bg1"/>
+              </a:solidFill>
+              <a:ln>
+                <a:noFill/>
+              </a:ln>
+            </p:spPr>
+            <p:style>
+              <a:lnRef idx="2">
+                <a:schemeClr val="accent1">
+                  <a:shade val="50000"/>
+                </a:schemeClr>
+              </a:lnRef>
+              <a:fillRef idx="1">
+                <a:schemeClr val="accent1"/>
+              </a:fillRef>
+              <a:effectRef idx="0">
+                <a:schemeClr val="accent1"/>
+              </a:effectRef>
+              <a:fontRef idx="minor">
+                <a:schemeClr val="lt1"/>
+              </a:fontRef>
+            </p:style>
+            <p:txBody>
+              <a:bodyPr rtlCol="0" anchor="ctr"/>
+              <a:lstStyle/>
+              <a:p>
+                <a:pPr algn="ctr"/>
+                <a:endParaRPr lang="nl-NL"/>
+              </a:p>
+            </p:txBody>
+          </p:sp>
+          <p:sp>
+            <p:nvSpPr>
+              <p:cNvPr id="21" name="Ovaal 20"/>
+              <p:cNvSpPr/>
+              <p:nvPr/>
+            </p:nvSpPr>
+            <p:spPr>
+              <a:xfrm>
+                <a:off x="3851920" y="4149080"/>
+                <a:ext cx="1008112" cy="1008112"/>
+              </a:xfrm>
+              <a:prstGeom prst="ellipse">
+                <a:avLst/>
+              </a:prstGeom>
+              <a:solidFill>
+                <a:schemeClr val="bg1">
+                  <a:lumMod val="50000"/>
+                </a:schemeClr>
+              </a:solidFill>
+              <a:ln>
+                <a:noFill/>
+              </a:ln>
+            </p:spPr>
+            <p:style>
+              <a:lnRef idx="2">
+                <a:schemeClr val="accent1">
+                  <a:shade val="50000"/>
+                </a:schemeClr>
+              </a:lnRef>
+              <a:fillRef idx="1">
+                <a:schemeClr val="accent1"/>
+              </a:fillRef>
+              <a:effectRef idx="0">
+                <a:schemeClr val="accent1"/>
+              </a:effectRef>
+              <a:fontRef idx="minor">
+                <a:schemeClr val="lt1"/>
+              </a:fontRef>
+            </p:style>
+            <p:txBody>
+              <a:bodyPr rtlCol="0" anchor="ctr"/>
+              <a:lstStyle/>
+              <a:p>
+                <a:pPr algn="ctr"/>
+                <a:endParaRPr lang="nl-NL"/>
+              </a:p>
+            </p:txBody>
+          </p:sp>
         </p:grpSp>
+        <p:sp>
+          <p:nvSpPr>
+            <p:cNvPr id="18" name="Ovaal 17"/>
+            <p:cNvSpPr/>
+            <p:nvPr/>
+          </p:nvSpPr>
+          <p:spPr>
+            <a:xfrm>
+              <a:off x="1642531" y="2587764"/>
+              <a:ext cx="98296" cy="98296"/>
+            </a:xfrm>
+            <a:prstGeom prst="ellipse">
+              <a:avLst/>
+            </a:prstGeom>
+            <a:solidFill>
+              <a:schemeClr val="bg1">
+                <a:lumMod val="50000"/>
+              </a:schemeClr>
+            </a:solidFill>
+            <a:ln w="63500">
+              <a:solidFill>
+                <a:srgbClr val="0000FF"/>
+              </a:solidFill>
+            </a:ln>
+          </p:spPr>
+          <p:style>
+            <a:lnRef idx="2">
+              <a:schemeClr val="accent1">
+                <a:shade val="50000"/>
+              </a:schemeClr>
+            </a:lnRef>
+            <a:fillRef idx="1">
+              <a:schemeClr val="accent1"/>
+            </a:fillRef>
+            <a:effectRef idx="0">
+              <a:schemeClr val="accent1"/>
+            </a:effectRef>
+            <a:fontRef idx="minor">
+              <a:schemeClr val="lt1"/>
+            </a:fontRef>
+          </p:style>
+          <p:txBody>
+            <a:bodyPr rtlCol="0" anchor="ctr"/>
+            <a:lstStyle/>
+            <a:p>
+              <a:pPr algn="ctr"/>
+              <a:endParaRPr lang="nl-NL"/>
+            </a:p>
+          </p:txBody>
+        </p:sp>
+      </p:grpSp>
+      <p:sp>
+        <p:nvSpPr>
+          <p:cNvPr id="22" name="Tekstvak 21"/>
+          <p:cNvSpPr txBox="1"/>
+          <p:nvPr/>
+        </p:nvSpPr>
+        <p:spPr>
+          <a:xfrm>
+            <a:off x="0" y="2924944"/>
+            <a:ext cx="1872208" cy="646331"/>
+          </a:xfrm>
+          <a:prstGeom prst="rect">
+            <a:avLst/>
+          </a:prstGeom>
+          <a:noFill/>
+        </p:spPr>
+        <p:txBody>
+          <a:bodyPr wrap="square" rtlCol="0">
+            <a:spAutoFit/>
+          </a:bodyPr>
+          <a:lstStyle/>
+          <a:p>
+            <a:r>
+              <a:rPr lang="en-US" sz="1200" dirty="0" smtClean="0">
+                <a:latin typeface="Lucida Sans Unicode" pitchFamily="34" charset="0"/>
+                <a:cs typeface="Lucida Sans Unicode" pitchFamily="34" charset="0"/>
+              </a:rPr>
+              <a:t>Phase: adaptation</a:t>
+            </a:r>
+          </a:p>
+          <a:p>
+            <a:r>
+              <a:rPr lang="en-US" sz="1200" dirty="0" err="1" smtClean="0">
+                <a:latin typeface="Lucida Sans Unicode" pitchFamily="34" charset="0"/>
+                <a:cs typeface="Lucida Sans Unicode" pitchFamily="34" charset="0"/>
+              </a:rPr>
+              <a:t>Dur</a:t>
+            </a:r>
+            <a:r>
+              <a:rPr lang="en-US" sz="1200" dirty="0" smtClean="0">
+                <a:latin typeface="Lucida Sans Unicode" pitchFamily="34" charset="0"/>
+                <a:cs typeface="Lucida Sans Unicode" pitchFamily="34" charset="0"/>
+              </a:rPr>
+              <a:t>:    1000-2000 ms</a:t>
+            </a:r>
+          </a:p>
+          <a:p>
+            <a:endParaRPr lang="nl-NL" sz="1200" dirty="0">
+              <a:latin typeface="Lucida Sans Unicode" pitchFamily="34" charset="0"/>
+              <a:cs typeface="Lucida Sans Unicode" pitchFamily="34" charset="0"/>
+            </a:endParaRPr>
+          </a:p>
+        </p:txBody>
+      </p:sp>
+      <p:sp>
+        <p:nvSpPr>
+          <p:cNvPr id="23" name="Tekstvak 22"/>
+          <p:cNvSpPr txBox="1"/>
+          <p:nvPr/>
+        </p:nvSpPr>
+        <p:spPr>
+          <a:xfrm>
+            <a:off x="1763688" y="3645024"/>
+            <a:ext cx="2088232" cy="646331"/>
+          </a:xfrm>
+          <a:prstGeom prst="rect">
+            <a:avLst/>
+          </a:prstGeom>
+          <a:noFill/>
+        </p:spPr>
+        <p:txBody>
+          <a:bodyPr wrap="square" rtlCol="0">
+            <a:spAutoFit/>
+          </a:bodyPr>
+          <a:lstStyle/>
+          <a:p>
+            <a:r>
+              <a:rPr lang="en-US" sz="1200" dirty="0" smtClean="0">
+                <a:latin typeface="Lucida Sans Unicode" pitchFamily="34" charset="0"/>
+                <a:cs typeface="Lucida Sans Unicode" pitchFamily="34" charset="0"/>
+              </a:rPr>
+              <a:t>Phase: </a:t>
+            </a:r>
+            <a:r>
+              <a:rPr lang="en-US" sz="1200" dirty="0" err="1" smtClean="0">
+                <a:latin typeface="Lucida Sans Unicode" pitchFamily="34" charset="0"/>
+                <a:cs typeface="Lucida Sans Unicode" pitchFamily="34" charset="0"/>
+              </a:rPr>
+              <a:t>sample_stim</a:t>
+            </a:r>
+            <a:endParaRPr lang="en-US" sz="1200" dirty="0" smtClean="0">
+              <a:latin typeface="Lucida Sans Unicode" pitchFamily="34" charset="0"/>
+              <a:cs typeface="Lucida Sans Unicode" pitchFamily="34" charset="0"/>
+            </a:endParaRPr>
+          </a:p>
+          <a:p>
+            <a:r>
+              <a:rPr lang="en-US" sz="1200" dirty="0" err="1" smtClean="0">
+                <a:latin typeface="Lucida Sans Unicode" pitchFamily="34" charset="0"/>
+                <a:cs typeface="Lucida Sans Unicode" pitchFamily="34" charset="0"/>
+              </a:rPr>
+              <a:t>Dur</a:t>
+            </a:r>
+            <a:r>
+              <a:rPr lang="en-US" sz="1200" dirty="0" smtClean="0">
+                <a:latin typeface="Lucida Sans Unicode" pitchFamily="34" charset="0"/>
+                <a:cs typeface="Lucida Sans Unicode" pitchFamily="34" charset="0"/>
+              </a:rPr>
+              <a:t>:     100 ms</a:t>
+            </a:r>
+          </a:p>
+          <a:p>
+            <a:endParaRPr lang="nl-NL" sz="1200" dirty="0">
+              <a:latin typeface="Lucida Sans Unicode" pitchFamily="34" charset="0"/>
+              <a:cs typeface="Lucida Sans Unicode" pitchFamily="34" charset="0"/>
+            </a:endParaRPr>
+          </a:p>
+        </p:txBody>
+      </p:sp>
+      <p:grpSp>
+        <p:nvGrpSpPr>
+          <p:cNvPr id="13" name="Groep 12"/>
+          <p:cNvGrpSpPr/>
+          <p:nvPr/>
+        </p:nvGrpSpPr>
+        <p:grpSpPr>
+          <a:xfrm>
+            <a:off x="1835696" y="1484784"/>
+            <a:ext cx="2304256" cy="2160240"/>
+            <a:chOff x="539552" y="1556792"/>
+            <a:chExt cx="2304256" cy="2160240"/>
+          </a:xfrm>
+        </p:grpSpPr>
+        <p:sp>
+          <p:nvSpPr>
+            <p:cNvPr id="6" name="Rechthoek 5"/>
+            <p:cNvSpPr/>
+            <p:nvPr/>
+          </p:nvSpPr>
+          <p:spPr>
+            <a:xfrm>
+              <a:off x="539552" y="1556792"/>
+              <a:ext cx="2304256" cy="2160240"/>
+            </a:xfrm>
+            <a:prstGeom prst="rect">
+              <a:avLst/>
+            </a:prstGeom>
+            <a:solidFill>
+              <a:schemeClr val="bg1">
+                <a:lumMod val="50000"/>
+              </a:schemeClr>
+            </a:solidFill>
+            <a:ln>
+              <a:solidFill>
+                <a:schemeClr val="tx1"/>
+              </a:solidFill>
+            </a:ln>
+          </p:spPr>
+          <p:style>
+            <a:lnRef idx="2">
+              <a:schemeClr val="accent1">
+                <a:shade val="50000"/>
+              </a:schemeClr>
+            </a:lnRef>
+            <a:fillRef idx="1">
+              <a:schemeClr val="accent1"/>
+            </a:fillRef>
+            <a:effectRef idx="0">
+              <a:schemeClr val="accent1"/>
+            </a:effectRef>
+            <a:fontRef idx="minor">
+              <a:schemeClr val="lt1"/>
+            </a:fontRef>
+          </p:style>
+          <p:txBody>
+            <a:bodyPr rtlCol="0" anchor="ctr"/>
+            <a:lstStyle/>
+            <a:p>
+              <a:pPr algn="ctr"/>
+              <a:endParaRPr lang="nl-NL"/>
+            </a:p>
+          </p:txBody>
+        </p:sp>
         <p:grpSp>
           <p:nvGrpSpPr>
-            <p:cNvPr id="91" name="Groep 90"/>
+            <p:cNvPr id="11" name="Groep 10"/>
             <p:cNvGrpSpPr/>
             <p:nvPr/>
           </p:nvGrpSpPr>
           <p:grpSpPr>
             <a:xfrm>
-              <a:off x="2051720" y="764704"/>
-              <a:ext cx="1512168" cy="1975495"/>
-              <a:chOff x="6461453" y="116632"/>
-              <a:chExt cx="2288988" cy="2990331"/>
+              <a:off x="683568" y="1628800"/>
+              <a:ext cx="2016224" cy="2016224"/>
+              <a:chOff x="3347864" y="3645024"/>
+              <a:chExt cx="2016224" cy="2016224"/>
             </a:xfrm>
           </p:grpSpPr>
-          <p:grpSp>
-            <p:nvGrpSpPr>
-              <p:cNvPr id="79" name="Groep 78"/>
-              <p:cNvGrpSpPr/>
-              <p:nvPr/>
-            </p:nvGrpSpPr>
-            <p:grpSpPr>
-              <a:xfrm>
-                <a:off x="6461453" y="116632"/>
-                <a:ext cx="2288988" cy="2990331"/>
-                <a:chOff x="6101413" y="116632"/>
-                <a:chExt cx="2288988" cy="2990331"/>
-              </a:xfrm>
-            </p:grpSpPr>
-            <p:sp>
-              <p:nvSpPr>
-                <p:cNvPr id="60" name="Rechthoek 59"/>
-                <p:cNvSpPr/>
-                <p:nvPr/>
-              </p:nvSpPr>
-              <p:spPr>
-                <a:xfrm>
-                  <a:off x="6300192" y="116632"/>
-                  <a:ext cx="936104" cy="1872208"/>
-                </a:xfrm>
-                <a:prstGeom prst="rect">
-                  <a:avLst/>
-                </a:prstGeom>
-                <a:solidFill>
-                  <a:schemeClr val="tx1">
-                    <a:lumMod val="85000"/>
-                    <a:lumOff val="15000"/>
-                  </a:schemeClr>
-                </a:solidFill>
-                <a:ln>
-                  <a:noFill/>
-                </a:ln>
-              </p:spPr>
-              <p:style>
-                <a:lnRef idx="2">
-                  <a:schemeClr val="accent1">
-                    <a:shade val="50000"/>
-                  </a:schemeClr>
-                </a:lnRef>
-                <a:fillRef idx="1">
-                  <a:schemeClr val="accent1"/>
-                </a:fillRef>
-                <a:effectRef idx="0">
-                  <a:schemeClr val="accent1"/>
-                </a:effectRef>
-                <a:fontRef idx="minor">
-                  <a:schemeClr val="lt1"/>
-                </a:fontRef>
-              </p:style>
-              <p:txBody>
-                <a:bodyPr rtlCol="0" anchor="ctr"/>
-                <a:lstStyle/>
-                <a:p>
-                  <a:pPr algn="ctr"/>
-                  <a:endParaRPr lang="nl-NL"/>
-                </a:p>
-              </p:txBody>
-            </p:sp>
-            <p:grpSp>
-              <p:nvGrpSpPr>
-                <p:cNvPr id="50" name="Groep 49"/>
-                <p:cNvGrpSpPr/>
-                <p:nvPr/>
-              </p:nvGrpSpPr>
-              <p:grpSpPr>
-                <a:xfrm>
-                  <a:off x="6101413" y="116632"/>
-                  <a:ext cx="2288988" cy="2990331"/>
-                  <a:chOff x="2068965" y="116632"/>
-                  <a:chExt cx="2288988" cy="2990331"/>
-                </a:xfrm>
-              </p:grpSpPr>
-              <p:grpSp>
-                <p:nvGrpSpPr>
-                  <p:cNvPr id="51" name="Groep 35"/>
-                  <p:cNvGrpSpPr/>
-                  <p:nvPr/>
-                </p:nvGrpSpPr>
-                <p:grpSpPr>
-                  <a:xfrm>
-                    <a:off x="2267744" y="116632"/>
-                    <a:ext cx="1872208" cy="1872208"/>
-                    <a:chOff x="547936" y="485056"/>
-                    <a:chExt cx="2592288" cy="2592288"/>
-                  </a:xfrm>
-                </p:grpSpPr>
-                <p:sp>
-                  <p:nvSpPr>
-                    <p:cNvPr id="53" name="Rechthoek 52"/>
-                    <p:cNvSpPr/>
-                    <p:nvPr/>
-                  </p:nvSpPr>
-                  <p:spPr>
-                    <a:xfrm>
-                      <a:off x="547936" y="485056"/>
-                      <a:ext cx="2592288" cy="2592288"/>
-                    </a:xfrm>
-                    <a:prstGeom prst="rect">
-                      <a:avLst/>
-                    </a:prstGeom>
-                    <a:noFill/>
-                    <a:ln w="12700">
-                      <a:solidFill>
-                        <a:schemeClr val="tx1"/>
-                      </a:solidFill>
-                    </a:ln>
-                  </p:spPr>
-                  <p:style>
-                    <a:lnRef idx="2">
-                      <a:schemeClr val="accent1">
-                        <a:shade val="50000"/>
-                      </a:schemeClr>
-                    </a:lnRef>
-                    <a:fillRef idx="1">
-                      <a:schemeClr val="accent1"/>
-                    </a:fillRef>
-                    <a:effectRef idx="0">
-                      <a:schemeClr val="accent1"/>
-                    </a:effectRef>
-                    <a:fontRef idx="minor">
-                      <a:schemeClr val="lt1"/>
-                    </a:fontRef>
-                  </p:style>
-                  <p:txBody>
-                    <a:bodyPr rtlCol="0" anchor="ctr"/>
-                    <a:lstStyle/>
-                    <a:p>
-                      <a:pPr algn="ctr"/>
-                      <a:endParaRPr lang="nl-NL" sz="1400"/>
-                    </a:p>
-                  </p:txBody>
-                </p:sp>
-                <p:sp>
-                  <p:nvSpPr>
-                    <p:cNvPr id="54" name="Ovaal 53"/>
-                    <p:cNvSpPr/>
-                    <p:nvPr/>
-                  </p:nvSpPr>
-                  <p:spPr>
-                    <a:xfrm>
-                      <a:off x="691952" y="629072"/>
-                      <a:ext cx="2304256" cy="2304256"/>
-                    </a:xfrm>
-                    <a:prstGeom prst="ellipse">
-                      <a:avLst/>
-                    </a:prstGeom>
-                    <a:noFill/>
-                    <a:ln w="9525">
-                      <a:solidFill>
-                        <a:schemeClr val="tx1"/>
-                      </a:solidFill>
-                      <a:prstDash val="lgDash"/>
-                    </a:ln>
-                  </p:spPr>
-                  <p:style>
-                    <a:lnRef idx="2">
-                      <a:schemeClr val="accent1">
-                        <a:shade val="50000"/>
-                      </a:schemeClr>
-                    </a:lnRef>
-                    <a:fillRef idx="1">
-                      <a:schemeClr val="accent1"/>
-                    </a:fillRef>
-                    <a:effectRef idx="0">
-                      <a:schemeClr val="accent1"/>
-                    </a:effectRef>
-                    <a:fontRef idx="minor">
-                      <a:schemeClr val="lt1"/>
-                    </a:fontRef>
-                  </p:style>
-                  <p:txBody>
-                    <a:bodyPr rtlCol="0" anchor="ctr"/>
-                    <a:lstStyle/>
-                    <a:p>
-                      <a:pPr algn="ctr"/>
-                      <a:endParaRPr lang="nl-NL" sz="1400"/>
-                    </a:p>
-                  </p:txBody>
-                </p:sp>
-                <p:sp>
-                  <p:nvSpPr>
-                    <p:cNvPr id="55" name="Ovaal 54"/>
-                    <p:cNvSpPr/>
-                    <p:nvPr/>
-                  </p:nvSpPr>
-                  <p:spPr>
-                    <a:xfrm rot="4500000">
-                      <a:off x="752032" y="788856"/>
-                      <a:ext cx="504055" cy="504055"/>
-                    </a:xfrm>
-                    <a:prstGeom prst="ellipse">
-                      <a:avLst/>
-                    </a:prstGeom>
-                    <a:blipFill dpi="0" rotWithShape="1">
-                      <a:blip r:embed="rId2" cstate="print"/>
-                      <a:srcRect/>
-                      <a:stretch>
-                        <a:fillRect/>
-                      </a:stretch>
-                    </a:blipFill>
-                    <a:ln>
-                      <a:noFill/>
-                    </a:ln>
-                  </p:spPr>
-                  <p:style>
-                    <a:lnRef idx="2">
-                      <a:schemeClr val="accent1">
-                        <a:shade val="50000"/>
-                      </a:schemeClr>
-                    </a:lnRef>
-                    <a:fillRef idx="1">
-                      <a:schemeClr val="accent1"/>
-                    </a:fillRef>
-                    <a:effectRef idx="0">
-                      <a:schemeClr val="accent1"/>
-                    </a:effectRef>
-                    <a:fontRef idx="minor">
-                      <a:schemeClr val="lt1"/>
-                    </a:fontRef>
-                  </p:style>
-                  <p:txBody>
-                    <a:bodyPr rtlCol="0" anchor="ctr"/>
-                    <a:lstStyle/>
-                    <a:p>
-                      <a:pPr algn="ctr"/>
-                      <a:endParaRPr lang="nl-NL" sz="1400"/>
-                    </a:p>
-                  </p:txBody>
-                </p:sp>
-              </p:grpSp>
-              <p:sp>
-                <p:nvSpPr>
-                  <p:cNvPr id="52" name="Tekstvak 51"/>
-                  <p:cNvSpPr txBox="1"/>
-                  <p:nvPr/>
-                </p:nvSpPr>
-                <p:spPr>
-                  <a:xfrm>
-                    <a:off x="2068965" y="1988838"/>
-                    <a:ext cx="2288988" cy="1118125"/>
-                  </a:xfrm>
-                  <a:prstGeom prst="rect">
-                    <a:avLst/>
-                  </a:prstGeom>
-                  <a:noFill/>
-                </p:spPr>
-                <p:txBody>
-                  <a:bodyPr wrap="square" rtlCol="0">
-                    <a:spAutoFit/>
-                  </a:bodyPr>
-                  <a:lstStyle/>
-                  <a:p>
-                    <a:pPr algn="ctr"/>
-                    <a:r>
-                      <a:rPr lang="en-US" sz="1400" dirty="0" smtClean="0"/>
-                      <a:t>2</a:t>
-                    </a:r>
-                    <a:r>
-                      <a:rPr lang="en-US" sz="1400" dirty="0" smtClean="0"/>
-                      <a:t>. Target: location + orientation</a:t>
-                    </a:r>
-                  </a:p>
-                  <a:p>
-                    <a:pPr algn="ctr"/>
-                    <a:r>
-                      <a:rPr lang="en-US" sz="1400" dirty="0" smtClean="0"/>
-                      <a:t>(100 ms)</a:t>
-                    </a:r>
-                    <a:endParaRPr lang="nl-NL" sz="1400" dirty="0"/>
-                  </a:p>
-                </p:txBody>
-              </p:sp>
-            </p:grpSp>
-          </p:grpSp>
           <p:sp>
             <p:nvSpPr>
-              <p:cNvPr id="59" name="Ovaal 58"/>
+              <p:cNvPr id="9" name="Koorde 8"/>
               <p:cNvSpPr/>
               <p:nvPr/>
             </p:nvSpPr>
             <p:spPr>
               <a:xfrm>
-                <a:off x="7542000" y="1000800"/>
-                <a:ext cx="104012" cy="104012"/>
+                <a:off x="3347864" y="3645024"/>
+                <a:ext cx="2016224" cy="2016224"/>
               </a:xfrm>
-              <a:prstGeom prst="ellipse">
-                <a:avLst/>
+              <a:prstGeom prst="chord">
+                <a:avLst>
+                  <a:gd name="adj1" fmla="val 5387812"/>
+                  <a:gd name="adj2" fmla="val 16200000"/>
+                </a:avLst>
               </a:prstGeom>
               <a:solidFill>
                 <a:schemeClr val="tx1"/>
@@ -3702,303 +3611,26 @@
               </a:p>
             </p:txBody>
           </p:sp>
-        </p:grpSp>
-        <p:grpSp>
-          <p:nvGrpSpPr>
-            <p:cNvPr id="99" name="Groep 98"/>
-            <p:cNvGrpSpPr/>
-            <p:nvPr/>
-          </p:nvGrpSpPr>
-          <p:grpSpPr>
-            <a:xfrm>
-              <a:off x="4716016" y="1772816"/>
-              <a:ext cx="2016224" cy="3330371"/>
-              <a:chOff x="2339752" y="2924944"/>
-              <a:chExt cx="2016224" cy="3330371"/>
-            </a:xfrm>
-          </p:grpSpPr>
-          <p:grpSp>
-            <p:nvGrpSpPr>
-              <p:cNvPr id="81" name="Groep 80"/>
-              <p:cNvGrpSpPr/>
-              <p:nvPr/>
-            </p:nvGrpSpPr>
-            <p:grpSpPr>
-              <a:xfrm>
-                <a:off x="2339752" y="2924944"/>
-                <a:ext cx="2016224" cy="3330371"/>
-                <a:chOff x="2339752" y="2924944"/>
-                <a:chExt cx="2016224" cy="3330371"/>
-              </a:xfrm>
-            </p:grpSpPr>
-            <p:grpSp>
-              <p:nvGrpSpPr>
-                <p:cNvPr id="73" name="Groep 72"/>
-                <p:cNvGrpSpPr/>
-                <p:nvPr/>
-              </p:nvGrpSpPr>
-              <p:grpSpPr>
-                <a:xfrm>
-                  <a:off x="2411760" y="3429000"/>
-                  <a:ext cx="1872208" cy="2826315"/>
-                  <a:chOff x="251520" y="116632"/>
-                  <a:chExt cx="1872208" cy="2826315"/>
-                </a:xfrm>
-              </p:grpSpPr>
-              <p:grpSp>
-                <p:nvGrpSpPr>
-                  <p:cNvPr id="74" name="Groep 23"/>
-                  <p:cNvGrpSpPr/>
-                  <p:nvPr/>
-                </p:nvGrpSpPr>
-                <p:grpSpPr>
-                  <a:xfrm>
-                    <a:off x="251520" y="116632"/>
-                    <a:ext cx="1872208" cy="1872208"/>
-                    <a:chOff x="3923928" y="476672"/>
-                    <a:chExt cx="2592288" cy="2592288"/>
-                  </a:xfrm>
-                </p:grpSpPr>
-                <p:sp>
-                  <p:nvSpPr>
-                    <p:cNvPr id="76" name="Rechthoek 75"/>
-                    <p:cNvSpPr/>
-                    <p:nvPr/>
-                  </p:nvSpPr>
-                  <p:spPr>
-                    <a:xfrm>
-                      <a:off x="3923928" y="476672"/>
-                      <a:ext cx="2592288" cy="2592288"/>
-                    </a:xfrm>
-                    <a:prstGeom prst="rect">
-                      <a:avLst/>
-                    </a:prstGeom>
-                    <a:solidFill>
-                      <a:schemeClr val="bg1">
-                        <a:lumMod val="65000"/>
-                      </a:schemeClr>
-                    </a:solidFill>
-                    <a:ln w="12700">
-                      <a:solidFill>
-                        <a:schemeClr val="tx1"/>
-                      </a:solidFill>
-                    </a:ln>
-                  </p:spPr>
-                  <p:style>
-                    <a:lnRef idx="2">
-                      <a:schemeClr val="accent1">
-                        <a:shade val="50000"/>
-                      </a:schemeClr>
-                    </a:lnRef>
-                    <a:fillRef idx="1">
-                      <a:schemeClr val="accent1"/>
-                    </a:fillRef>
-                    <a:effectRef idx="0">
-                      <a:schemeClr val="accent1"/>
-                    </a:effectRef>
-                    <a:fontRef idx="minor">
-                      <a:schemeClr val="lt1"/>
-                    </a:fontRef>
-                  </p:style>
-                  <p:txBody>
-                    <a:bodyPr rtlCol="0" anchor="ctr"/>
-                    <a:lstStyle/>
-                    <a:p>
-                      <a:pPr algn="ctr"/>
-                      <a:endParaRPr lang="nl-NL" sz="1400"/>
-                    </a:p>
-                  </p:txBody>
-                </p:sp>
-                <p:sp>
-                  <p:nvSpPr>
-                    <p:cNvPr id="77" name="Ovaal 76"/>
-                    <p:cNvSpPr/>
-                    <p:nvPr/>
-                  </p:nvSpPr>
-                  <p:spPr>
-                    <a:xfrm>
-                      <a:off x="4067944" y="620688"/>
-                      <a:ext cx="2304256" cy="2304256"/>
-                    </a:xfrm>
-                    <a:prstGeom prst="ellipse">
-                      <a:avLst/>
-                    </a:prstGeom>
-                    <a:noFill/>
-                    <a:ln w="9525">
-                      <a:solidFill>
-                        <a:schemeClr val="tx1"/>
-                      </a:solidFill>
-                      <a:prstDash val="lgDash"/>
-                    </a:ln>
-                  </p:spPr>
-                  <p:style>
-                    <a:lnRef idx="2">
-                      <a:schemeClr val="accent1">
-                        <a:shade val="50000"/>
-                      </a:schemeClr>
-                    </a:lnRef>
-                    <a:fillRef idx="1">
-                      <a:schemeClr val="accent1"/>
-                    </a:fillRef>
-                    <a:effectRef idx="0">
-                      <a:schemeClr val="accent1"/>
-                    </a:effectRef>
-                    <a:fontRef idx="minor">
-                      <a:schemeClr val="lt1"/>
-                    </a:fontRef>
-                  </p:style>
-                  <p:txBody>
-                    <a:bodyPr rtlCol="0" anchor="ctr"/>
-                    <a:lstStyle/>
-                    <a:p>
-                      <a:pPr algn="ctr"/>
-                      <a:endParaRPr lang="nl-NL" sz="1400"/>
-                    </a:p>
-                  </p:txBody>
-                </p:sp>
-                <p:sp>
-                  <p:nvSpPr>
-                    <p:cNvPr id="78" name="Ovaal 77"/>
-                    <p:cNvSpPr/>
-                    <p:nvPr/>
-                  </p:nvSpPr>
-                  <p:spPr>
-                    <a:xfrm>
-                      <a:off x="5148064" y="1700808"/>
-                      <a:ext cx="144016" cy="144016"/>
-                    </a:xfrm>
-                    <a:prstGeom prst="ellipse">
-                      <a:avLst/>
-                    </a:prstGeom>
-                    <a:solidFill>
-                      <a:schemeClr val="tx1"/>
-                    </a:solidFill>
-                    <a:ln>
-                      <a:noFill/>
-                    </a:ln>
-                  </p:spPr>
-                  <p:style>
-                    <a:lnRef idx="2">
-                      <a:schemeClr val="accent1">
-                        <a:shade val="50000"/>
-                      </a:schemeClr>
-                    </a:lnRef>
-                    <a:fillRef idx="1">
-                      <a:schemeClr val="accent1"/>
-                    </a:fillRef>
-                    <a:effectRef idx="0">
-                      <a:schemeClr val="accent1"/>
-                    </a:effectRef>
-                    <a:fontRef idx="minor">
-                      <a:schemeClr val="lt1"/>
-                    </a:fontRef>
-                  </p:style>
-                  <p:txBody>
-                    <a:bodyPr rtlCol="0" anchor="ctr"/>
-                    <a:lstStyle/>
-                    <a:p>
-                      <a:pPr algn="ctr"/>
-                      <a:endParaRPr lang="nl-NL" sz="1400"/>
-                    </a:p>
-                  </p:txBody>
-                </p:sp>
-              </p:grpSp>
-              <p:sp>
-                <p:nvSpPr>
-                  <p:cNvPr id="75" name="Tekstvak 74"/>
-                  <p:cNvSpPr txBox="1"/>
-                  <p:nvPr/>
-                </p:nvSpPr>
-                <p:spPr>
-                  <a:xfrm>
-                    <a:off x="251520" y="1988840"/>
-                    <a:ext cx="1872208" cy="954107"/>
-                  </a:xfrm>
-                  <a:prstGeom prst="rect">
-                    <a:avLst/>
-                  </a:prstGeom>
-                  <a:noFill/>
-                </p:spPr>
-                <p:txBody>
-                  <a:bodyPr wrap="square" rtlCol="0">
-                    <a:spAutoFit/>
-                  </a:bodyPr>
-                  <a:lstStyle/>
-                  <a:p>
-                    <a:pPr algn="ctr"/>
-                    <a:r>
-                      <a:rPr lang="en-US" sz="1400" dirty="0" smtClean="0"/>
-                      <a:t>Displacement: c</a:t>
-                    </a:r>
-                    <a:r>
-                      <a:rPr lang="en-US" sz="1400" dirty="0" smtClean="0"/>
-                      <a:t>lockwise / counterclockwise</a:t>
-                    </a:r>
-                  </a:p>
-                  <a:p>
-                    <a:pPr algn="ctr"/>
-                    <a:r>
-                      <a:rPr lang="en-US" sz="1400" dirty="0" smtClean="0"/>
-                      <a:t>(until response)</a:t>
-                    </a:r>
-                    <a:endParaRPr lang="nl-NL" sz="1400" dirty="0"/>
-                  </a:p>
-                </p:txBody>
-              </p:sp>
-            </p:grpSp>
-            <p:sp>
-              <p:nvSpPr>
-                <p:cNvPr id="80" name="Tekstvak 79"/>
-                <p:cNvSpPr txBox="1"/>
-                <p:nvPr/>
-              </p:nvSpPr>
-              <p:spPr>
-                <a:xfrm>
-                  <a:off x="2339752" y="2924944"/>
-                  <a:ext cx="2016224" cy="369332"/>
-                </a:xfrm>
-                <a:prstGeom prst="rect">
-                  <a:avLst/>
-                </a:prstGeom>
-                <a:noFill/>
-              </p:spPr>
-              <p:txBody>
-                <a:bodyPr wrap="square" rtlCol="0">
-                  <a:spAutoFit/>
-                </a:bodyPr>
-                <a:lstStyle/>
-                <a:p>
-                  <a:pPr algn="ctr"/>
-                  <a:r>
-                    <a:rPr lang="en-US" dirty="0" smtClean="0"/>
-                    <a:t>SWM</a:t>
-                  </a:r>
-                  <a:endParaRPr lang="nl-NL" dirty="0"/>
-                </a:p>
-              </p:txBody>
-            </p:sp>
-          </p:grpSp>
           <p:sp>
             <p:nvSpPr>
-              <p:cNvPr id="90" name="Ovaal 89"/>
+              <p:cNvPr id="10" name="Koorde 9"/>
               <p:cNvSpPr/>
               <p:nvPr/>
             </p:nvSpPr>
             <p:spPr>
-              <a:xfrm rot="4500000">
-                <a:off x="2668692" y="3541916"/>
-                <a:ext cx="364040" cy="364040"/>
+              <a:xfrm rot="10800000">
+                <a:off x="3347864" y="3645024"/>
+                <a:ext cx="2016224" cy="2016224"/>
               </a:xfrm>
-              <a:prstGeom prst="ellipse">
-                <a:avLst/>
+              <a:prstGeom prst="chord">
+                <a:avLst>
+                  <a:gd name="adj1" fmla="val 5387812"/>
+                  <a:gd name="adj2" fmla="val 16200000"/>
+                </a:avLst>
               </a:prstGeom>
-              <a:blipFill dpi="0" rotWithShape="1">
-                <a:blip r:embed="rId2" cstate="print"/>
-                <a:srcRect/>
-                <a:stretch>
-                  <a:fillRect/>
-                </a:stretch>
-              </a:blipFill>
+              <a:solidFill>
+                <a:schemeClr val="bg1"/>
+              </a:solidFill>
               <a:ln>
                 <a:noFill/>
               </a:ln>
@@ -4024,530 +3656,29 @@
               <a:lstStyle/>
               <a:p>
                 <a:pPr algn="ctr"/>
-                <a:endParaRPr lang="nl-NL" sz="1400"/>
+                <a:endParaRPr lang="nl-NL"/>
               </a:p>
             </p:txBody>
           </p:sp>
-        </p:grpSp>
-        <p:grpSp>
-          <p:nvGrpSpPr>
-            <p:cNvPr id="92" name="Groep 91"/>
-            <p:cNvGrpSpPr/>
-            <p:nvPr/>
-          </p:nvGrpSpPr>
-          <p:grpSpPr>
-            <a:xfrm>
-              <a:off x="3347864" y="1412776"/>
-              <a:ext cx="1512168" cy="1760053"/>
-              <a:chOff x="52742" y="116632"/>
-              <a:chExt cx="2288986" cy="2664212"/>
-            </a:xfrm>
-          </p:grpSpPr>
-          <p:grpSp>
-            <p:nvGrpSpPr>
-              <p:cNvPr id="93" name="Groep 23"/>
-              <p:cNvGrpSpPr/>
-              <p:nvPr/>
-            </p:nvGrpSpPr>
-            <p:grpSpPr>
-              <a:xfrm>
-                <a:off x="251520" y="116632"/>
-                <a:ext cx="1872208" cy="1872208"/>
-                <a:chOff x="3923928" y="476672"/>
-                <a:chExt cx="2592288" cy="2592288"/>
-              </a:xfrm>
-            </p:grpSpPr>
-            <p:sp>
-              <p:nvSpPr>
-                <p:cNvPr id="95" name="Rechthoek 94"/>
-                <p:cNvSpPr/>
-                <p:nvPr/>
-              </p:nvSpPr>
-              <p:spPr>
-                <a:xfrm>
-                  <a:off x="3923928" y="476672"/>
-                  <a:ext cx="2592288" cy="2592288"/>
-                </a:xfrm>
-                <a:prstGeom prst="rect">
-                  <a:avLst/>
-                </a:prstGeom>
-                <a:solidFill>
-                  <a:schemeClr val="bg1">
-                    <a:lumMod val="65000"/>
-                  </a:schemeClr>
-                </a:solidFill>
-                <a:ln w="12700">
-                  <a:solidFill>
-                    <a:schemeClr val="tx1"/>
-                  </a:solidFill>
-                </a:ln>
-              </p:spPr>
-              <p:style>
-                <a:lnRef idx="2">
-                  <a:schemeClr val="accent1">
-                    <a:shade val="50000"/>
-                  </a:schemeClr>
-                </a:lnRef>
-                <a:fillRef idx="1">
-                  <a:schemeClr val="accent1"/>
-                </a:fillRef>
-                <a:effectRef idx="0">
-                  <a:schemeClr val="accent1"/>
-                </a:effectRef>
-                <a:fontRef idx="minor">
-                  <a:schemeClr val="lt1"/>
-                </a:fontRef>
-              </p:style>
-              <p:txBody>
-                <a:bodyPr rtlCol="0" anchor="ctr"/>
-                <a:lstStyle/>
-                <a:p>
-                  <a:pPr algn="ctr"/>
-                  <a:endParaRPr lang="nl-NL" sz="1400"/>
-                </a:p>
-              </p:txBody>
-            </p:sp>
-            <p:sp>
-              <p:nvSpPr>
-                <p:cNvPr id="96" name="Ovaal 95"/>
-                <p:cNvSpPr/>
-                <p:nvPr/>
-              </p:nvSpPr>
-              <p:spPr>
-                <a:xfrm>
-                  <a:off x="4067944" y="620688"/>
-                  <a:ext cx="2304256" cy="2304256"/>
-                </a:xfrm>
-                <a:prstGeom prst="ellipse">
-                  <a:avLst/>
-                </a:prstGeom>
-                <a:noFill/>
-                <a:ln w="9525">
-                  <a:solidFill>
-                    <a:schemeClr val="tx1"/>
-                  </a:solidFill>
-                  <a:prstDash val="lgDash"/>
-                </a:ln>
-              </p:spPr>
-              <p:style>
-                <a:lnRef idx="2">
-                  <a:schemeClr val="accent1">
-                    <a:shade val="50000"/>
-                  </a:schemeClr>
-                </a:lnRef>
-                <a:fillRef idx="1">
-                  <a:schemeClr val="accent1"/>
-                </a:fillRef>
-                <a:effectRef idx="0">
-                  <a:schemeClr val="accent1"/>
-                </a:effectRef>
-                <a:fontRef idx="minor">
-                  <a:schemeClr val="lt1"/>
-                </a:fontRef>
-              </p:style>
-              <p:txBody>
-                <a:bodyPr rtlCol="0" anchor="ctr"/>
-                <a:lstStyle/>
-                <a:p>
-                  <a:pPr algn="ctr"/>
-                  <a:endParaRPr lang="nl-NL" sz="1400"/>
-                </a:p>
-              </p:txBody>
-            </p:sp>
-            <p:sp>
-              <p:nvSpPr>
-                <p:cNvPr id="97" name="Ovaal 96"/>
-                <p:cNvSpPr/>
-                <p:nvPr/>
-              </p:nvSpPr>
-              <p:spPr>
-                <a:xfrm>
-                  <a:off x="5148064" y="1700808"/>
-                  <a:ext cx="144016" cy="144016"/>
-                </a:xfrm>
-                <a:prstGeom prst="ellipse">
-                  <a:avLst/>
-                </a:prstGeom>
-                <a:solidFill>
-                  <a:schemeClr val="tx1"/>
-                </a:solidFill>
-                <a:ln>
-                  <a:noFill/>
-                </a:ln>
-              </p:spPr>
-              <p:style>
-                <a:lnRef idx="2">
-                  <a:schemeClr val="accent1">
-                    <a:shade val="50000"/>
-                  </a:schemeClr>
-                </a:lnRef>
-                <a:fillRef idx="1">
-                  <a:schemeClr val="accent1"/>
-                </a:fillRef>
-                <a:effectRef idx="0">
-                  <a:schemeClr val="accent1"/>
-                </a:effectRef>
-                <a:fontRef idx="minor">
-                  <a:schemeClr val="lt1"/>
-                </a:fontRef>
-              </p:style>
-              <p:txBody>
-                <a:bodyPr rtlCol="0" anchor="ctr"/>
-                <a:lstStyle/>
-                <a:p>
-                  <a:pPr algn="ctr"/>
-                  <a:endParaRPr lang="nl-NL" sz="1400"/>
-                </a:p>
-              </p:txBody>
-            </p:sp>
-          </p:grpSp>
           <p:sp>
             <p:nvSpPr>
-              <p:cNvPr id="94" name="Tekstvak 93"/>
-              <p:cNvSpPr txBox="1"/>
+              <p:cNvPr id="8" name="Ovaal 7"/>
+              <p:cNvSpPr/>
               <p:nvPr/>
             </p:nvSpPr>
             <p:spPr>
               <a:xfrm>
-                <a:off x="52742" y="1988840"/>
-                <a:ext cx="2288986" cy="792004"/>
-              </a:xfrm>
-              <a:prstGeom prst="rect">
-                <a:avLst/>
-              </a:prstGeom>
-              <a:noFill/>
-            </p:spPr>
-            <p:txBody>
-              <a:bodyPr wrap="square" rtlCol="0">
-                <a:spAutoFit/>
-              </a:bodyPr>
-              <a:lstStyle/>
-              <a:p>
-                <a:pPr algn="ctr"/>
-                <a:r>
-                  <a:rPr lang="en-US" sz="1400" dirty="0" smtClean="0"/>
-                  <a:t>3</a:t>
-                </a:r>
-                <a:r>
-                  <a:rPr lang="en-US" sz="1400" dirty="0" smtClean="0"/>
-                  <a:t>. </a:t>
-                </a:r>
-                <a:r>
-                  <a:rPr lang="en-US" sz="1400" dirty="0" smtClean="0"/>
-                  <a:t>WM </a:t>
-                </a:r>
-                <a:r>
-                  <a:rPr lang="en-US" sz="1400" dirty="0" smtClean="0"/>
-                  <a:t>delay</a:t>
-                </a:r>
-              </a:p>
-              <a:p>
-                <a:pPr algn="ctr"/>
-                <a:r>
-                  <a:rPr lang="en-US" sz="1400" dirty="0" smtClean="0"/>
-                  <a:t>(3000-4000 ms)</a:t>
-                </a:r>
-                <a:endParaRPr lang="nl-NL" sz="1400" dirty="0"/>
-              </a:p>
-            </p:txBody>
-          </p:sp>
-        </p:grpSp>
-        <p:grpSp>
-          <p:nvGrpSpPr>
-            <p:cNvPr id="57" name="Groep 56"/>
-            <p:cNvGrpSpPr/>
-            <p:nvPr/>
-          </p:nvGrpSpPr>
-          <p:grpSpPr>
-            <a:xfrm>
-              <a:off x="6876256" y="1772816"/>
-              <a:ext cx="2016224" cy="3114928"/>
-              <a:chOff x="3779912" y="3717032"/>
-              <a:chExt cx="2016224" cy="3114928"/>
-            </a:xfrm>
-          </p:grpSpPr>
-          <p:grpSp>
-            <p:nvGrpSpPr>
-              <p:cNvPr id="82" name="Groep 81"/>
-              <p:cNvGrpSpPr/>
-              <p:nvPr/>
-            </p:nvGrpSpPr>
-            <p:grpSpPr>
-              <a:xfrm>
-                <a:off x="3779912" y="3717032"/>
-                <a:ext cx="2016224" cy="3114928"/>
-                <a:chOff x="2339752" y="2924944"/>
-                <a:chExt cx="2016224" cy="3114928"/>
-              </a:xfrm>
-            </p:grpSpPr>
-            <p:grpSp>
-              <p:nvGrpSpPr>
-                <p:cNvPr id="83" name="Groep 72"/>
-                <p:cNvGrpSpPr/>
-                <p:nvPr/>
-              </p:nvGrpSpPr>
-              <p:grpSpPr>
-                <a:xfrm>
-                  <a:off x="2411760" y="3429000"/>
-                  <a:ext cx="1872208" cy="2610872"/>
-                  <a:chOff x="251520" y="116632"/>
-                  <a:chExt cx="1872208" cy="2610872"/>
-                </a:xfrm>
-              </p:grpSpPr>
-              <p:grpSp>
-                <p:nvGrpSpPr>
-                  <p:cNvPr id="85" name="Groep 23"/>
-                  <p:cNvGrpSpPr/>
-                  <p:nvPr/>
-                </p:nvGrpSpPr>
-                <p:grpSpPr>
-                  <a:xfrm>
-                    <a:off x="251520" y="116632"/>
-                    <a:ext cx="1872208" cy="1872208"/>
-                    <a:chOff x="3923928" y="476672"/>
-                    <a:chExt cx="2592288" cy="2592288"/>
-                  </a:xfrm>
-                </p:grpSpPr>
-                <p:sp>
-                  <p:nvSpPr>
-                    <p:cNvPr id="87" name="Rechthoek 86"/>
-                    <p:cNvSpPr/>
-                    <p:nvPr/>
-                  </p:nvSpPr>
-                  <p:spPr>
-                    <a:xfrm>
-                      <a:off x="3923928" y="476672"/>
-                      <a:ext cx="2592288" cy="2592288"/>
-                    </a:xfrm>
-                    <a:prstGeom prst="rect">
-                      <a:avLst/>
-                    </a:prstGeom>
-                    <a:solidFill>
-                      <a:schemeClr val="bg1">
-                        <a:lumMod val="65000"/>
-                      </a:schemeClr>
-                    </a:solidFill>
-                    <a:ln w="12700">
-                      <a:solidFill>
-                        <a:schemeClr val="tx1"/>
-                      </a:solidFill>
-                    </a:ln>
-                  </p:spPr>
-                  <p:style>
-                    <a:lnRef idx="2">
-                      <a:schemeClr val="accent1">
-                        <a:shade val="50000"/>
-                      </a:schemeClr>
-                    </a:lnRef>
-                    <a:fillRef idx="1">
-                      <a:schemeClr val="accent1"/>
-                    </a:fillRef>
-                    <a:effectRef idx="0">
-                      <a:schemeClr val="accent1"/>
-                    </a:effectRef>
-                    <a:fontRef idx="minor">
-                      <a:schemeClr val="lt1"/>
-                    </a:fontRef>
-                  </p:style>
-                  <p:txBody>
-                    <a:bodyPr rtlCol="0" anchor="ctr"/>
-                    <a:lstStyle/>
-                    <a:p>
-                      <a:pPr algn="ctr"/>
-                      <a:endParaRPr lang="nl-NL" sz="1400"/>
-                    </a:p>
-                  </p:txBody>
-                </p:sp>
-                <p:sp>
-                  <p:nvSpPr>
-                    <p:cNvPr id="88" name="Ovaal 87"/>
-                    <p:cNvSpPr/>
-                    <p:nvPr/>
-                  </p:nvSpPr>
-                  <p:spPr>
-                    <a:xfrm>
-                      <a:off x="4067944" y="620688"/>
-                      <a:ext cx="2304256" cy="2304256"/>
-                    </a:xfrm>
-                    <a:prstGeom prst="ellipse">
-                      <a:avLst/>
-                    </a:prstGeom>
-                    <a:noFill/>
-                    <a:ln w="9525">
-                      <a:solidFill>
-                        <a:schemeClr val="tx1"/>
-                      </a:solidFill>
-                      <a:prstDash val="lgDash"/>
-                    </a:ln>
-                  </p:spPr>
-                  <p:style>
-                    <a:lnRef idx="2">
-                      <a:schemeClr val="accent1">
-                        <a:shade val="50000"/>
-                      </a:schemeClr>
-                    </a:lnRef>
-                    <a:fillRef idx="1">
-                      <a:schemeClr val="accent1"/>
-                    </a:fillRef>
-                    <a:effectRef idx="0">
-                      <a:schemeClr val="accent1"/>
-                    </a:effectRef>
-                    <a:fontRef idx="minor">
-                      <a:schemeClr val="lt1"/>
-                    </a:fontRef>
-                  </p:style>
-                  <p:txBody>
-                    <a:bodyPr rtlCol="0" anchor="ctr"/>
-                    <a:lstStyle/>
-                    <a:p>
-                      <a:pPr algn="ctr"/>
-                      <a:endParaRPr lang="nl-NL" sz="1400"/>
-                    </a:p>
-                  </p:txBody>
-                </p:sp>
-                <p:sp>
-                  <p:nvSpPr>
-                    <p:cNvPr id="89" name="Ovaal 88"/>
-                    <p:cNvSpPr/>
-                    <p:nvPr/>
-                  </p:nvSpPr>
-                  <p:spPr>
-                    <a:xfrm>
-                      <a:off x="5148064" y="1700808"/>
-                      <a:ext cx="144016" cy="144016"/>
-                    </a:xfrm>
-                    <a:prstGeom prst="ellipse">
-                      <a:avLst/>
-                    </a:prstGeom>
-                    <a:solidFill>
-                      <a:schemeClr val="tx1"/>
-                    </a:solidFill>
-                    <a:ln>
-                      <a:noFill/>
-                    </a:ln>
-                  </p:spPr>
-                  <p:style>
-                    <a:lnRef idx="2">
-                      <a:schemeClr val="accent1">
-                        <a:shade val="50000"/>
-                      </a:schemeClr>
-                    </a:lnRef>
-                    <a:fillRef idx="1">
-                      <a:schemeClr val="accent1"/>
-                    </a:fillRef>
-                    <a:effectRef idx="0">
-                      <a:schemeClr val="accent1"/>
-                    </a:effectRef>
-                    <a:fontRef idx="minor">
-                      <a:schemeClr val="lt1"/>
-                    </a:fontRef>
-                  </p:style>
-                  <p:txBody>
-                    <a:bodyPr rtlCol="0" anchor="ctr"/>
-                    <a:lstStyle/>
-                    <a:p>
-                      <a:pPr algn="ctr"/>
-                      <a:endParaRPr lang="nl-NL" sz="1400"/>
-                    </a:p>
-                  </p:txBody>
-                </p:sp>
-              </p:grpSp>
-              <p:sp>
-                <p:nvSpPr>
-                  <p:cNvPr id="86" name="Tekstvak 85"/>
-                  <p:cNvSpPr txBox="1"/>
-                  <p:nvPr/>
-                </p:nvSpPr>
-                <p:spPr>
-                  <a:xfrm>
-                    <a:off x="251520" y="1988840"/>
-                    <a:ext cx="1872208" cy="738664"/>
-                  </a:xfrm>
-                  <a:prstGeom prst="rect">
-                    <a:avLst/>
-                  </a:prstGeom>
-                  <a:noFill/>
-                </p:spPr>
-                <p:txBody>
-                  <a:bodyPr wrap="square" rtlCol="0">
-                    <a:spAutoFit/>
-                  </a:bodyPr>
-                  <a:lstStyle/>
-                  <a:p>
-                    <a:pPr algn="ctr"/>
-                    <a:r>
-                      <a:rPr lang="en-US" sz="1400" dirty="0" smtClean="0"/>
-                      <a:t>Orientation: </a:t>
-                    </a:r>
-                    <a:r>
-                      <a:rPr lang="en-US" sz="1400" dirty="0" smtClean="0"/>
-                      <a:t>clockwise / counterclockwise?</a:t>
-                    </a:r>
-                  </a:p>
-                  <a:p>
-                    <a:pPr algn="ctr"/>
-                    <a:r>
-                      <a:rPr lang="en-US" sz="1400" dirty="0" smtClean="0"/>
-                      <a:t>(until response)</a:t>
-                    </a:r>
-                    <a:endParaRPr lang="nl-NL" sz="1400" dirty="0"/>
-                  </a:p>
-                </p:txBody>
-              </p:sp>
-            </p:grpSp>
-            <p:sp>
-              <p:nvSpPr>
-                <p:cNvPr id="84" name="Tekstvak 83"/>
-                <p:cNvSpPr txBox="1"/>
-                <p:nvPr/>
-              </p:nvSpPr>
-              <p:spPr>
-                <a:xfrm>
-                  <a:off x="2339752" y="2924944"/>
-                  <a:ext cx="2016224" cy="369332"/>
-                </a:xfrm>
-                <a:prstGeom prst="rect">
-                  <a:avLst/>
-                </a:prstGeom>
-                <a:noFill/>
-              </p:spPr>
-              <p:txBody>
-                <a:bodyPr wrap="square" rtlCol="0">
-                  <a:spAutoFit/>
-                </a:bodyPr>
-                <a:lstStyle/>
-                <a:p>
-                  <a:pPr algn="ctr"/>
-                  <a:r>
-                    <a:rPr lang="en-US" dirty="0" smtClean="0"/>
-                    <a:t>Control</a:t>
-                  </a:r>
-                  <a:endParaRPr lang="nl-NL" dirty="0"/>
-                </a:p>
-              </p:txBody>
-            </p:sp>
-          </p:grpSp>
-          <p:sp>
-            <p:nvSpPr>
-              <p:cNvPr id="56" name="Ovaal 55"/>
-              <p:cNvSpPr/>
-              <p:nvPr/>
-            </p:nvSpPr>
-            <p:spPr>
-              <a:xfrm rot="2700000">
-                <a:off x="4608000" y="4968000"/>
-                <a:ext cx="364040" cy="364040"/>
+                <a:off x="3851920" y="4149080"/>
+                <a:ext cx="1008112" cy="1008112"/>
               </a:xfrm>
               <a:prstGeom prst="ellipse">
                 <a:avLst/>
               </a:prstGeom>
-              <a:blipFill dpi="0" rotWithShape="1">
-                <a:blip r:embed="rId2" cstate="print"/>
-                <a:srcRect/>
-                <a:stretch>
-                  <a:fillRect/>
-                </a:stretch>
-              </a:blipFill>
+              <a:solidFill>
+                <a:schemeClr val="bg1">
+                  <a:lumMod val="50000"/>
+                </a:schemeClr>
+              </a:solidFill>
               <a:ln>
                 <a:noFill/>
               </a:ln>
@@ -4573,12 +3704,1196 @@
               <a:lstStyle/>
               <a:p>
                 <a:pPr algn="ctr"/>
-                <a:endParaRPr lang="nl-NL" sz="1400"/>
+                <a:endParaRPr lang="nl-NL"/>
               </a:p>
             </p:txBody>
           </p:sp>
         </p:grpSp>
+        <p:sp>
+          <p:nvSpPr>
+            <p:cNvPr id="7" name="Ovaal 6"/>
+            <p:cNvSpPr/>
+            <p:nvPr/>
+          </p:nvSpPr>
+          <p:spPr>
+            <a:xfrm rot="4500000">
+              <a:off x="1066602" y="2011834"/>
+              <a:ext cx="204618" cy="204618"/>
+            </a:xfrm>
+            <a:prstGeom prst="ellipse">
+              <a:avLst/>
+            </a:prstGeom>
+            <a:blipFill dpi="0" rotWithShape="1">
+              <a:blip r:embed="rId2" cstate="print"/>
+              <a:srcRect/>
+              <a:stretch>
+                <a:fillRect/>
+              </a:stretch>
+            </a:blipFill>
+            <a:ln>
+              <a:noFill/>
+            </a:ln>
+          </p:spPr>
+          <p:style>
+            <a:lnRef idx="2">
+              <a:schemeClr val="accent1">
+                <a:shade val="50000"/>
+              </a:schemeClr>
+            </a:lnRef>
+            <a:fillRef idx="1">
+              <a:schemeClr val="accent1"/>
+            </a:fillRef>
+            <a:effectRef idx="0">
+              <a:schemeClr val="accent1"/>
+            </a:effectRef>
+            <a:fontRef idx="minor">
+              <a:schemeClr val="lt1"/>
+            </a:fontRef>
+          </p:style>
+          <p:txBody>
+            <a:bodyPr rtlCol="0" anchor="ctr"/>
+            <a:lstStyle/>
+            <a:p>
+              <a:pPr algn="ctr"/>
+              <a:endParaRPr lang="nl-NL" sz="1400"/>
+            </a:p>
+          </p:txBody>
+        </p:sp>
+        <p:sp>
+          <p:nvSpPr>
+            <p:cNvPr id="12" name="Ovaal 11"/>
+            <p:cNvSpPr/>
+            <p:nvPr/>
+          </p:nvSpPr>
+          <p:spPr>
+            <a:xfrm>
+              <a:off x="1646554" y="2587764"/>
+              <a:ext cx="98296" cy="98296"/>
+            </a:xfrm>
+            <a:prstGeom prst="ellipse">
+              <a:avLst/>
+            </a:prstGeom>
+            <a:solidFill>
+              <a:schemeClr val="bg1">
+                <a:lumMod val="50000"/>
+              </a:schemeClr>
+            </a:solidFill>
+            <a:ln w="63500">
+              <a:solidFill>
+                <a:srgbClr val="0000FF"/>
+              </a:solidFill>
+            </a:ln>
+          </p:spPr>
+          <p:style>
+            <a:lnRef idx="2">
+              <a:schemeClr val="accent1">
+                <a:shade val="50000"/>
+              </a:schemeClr>
+            </a:lnRef>
+            <a:fillRef idx="1">
+              <a:schemeClr val="accent1"/>
+            </a:fillRef>
+            <a:effectRef idx="0">
+              <a:schemeClr val="accent1"/>
+            </a:effectRef>
+            <a:fontRef idx="minor">
+              <a:schemeClr val="lt1"/>
+            </a:fontRef>
+          </p:style>
+          <p:txBody>
+            <a:bodyPr rtlCol="0" anchor="ctr"/>
+            <a:lstStyle/>
+            <a:p>
+              <a:pPr algn="ctr"/>
+              <a:endParaRPr lang="nl-NL"/>
+            </a:p>
+          </p:txBody>
+        </p:sp>
       </p:grpSp>
+      <p:sp>
+        <p:nvSpPr>
+          <p:cNvPr id="31" name="Tekstvak 30"/>
+          <p:cNvSpPr txBox="1"/>
+          <p:nvPr/>
+        </p:nvSpPr>
+        <p:spPr>
+          <a:xfrm>
+            <a:off x="3347864" y="4149080"/>
+            <a:ext cx="2088232" cy="646331"/>
+          </a:xfrm>
+          <a:prstGeom prst="rect">
+            <a:avLst/>
+          </a:prstGeom>
+          <a:noFill/>
+        </p:spPr>
+        <p:txBody>
+          <a:bodyPr wrap="square" rtlCol="0">
+            <a:spAutoFit/>
+          </a:bodyPr>
+          <a:lstStyle/>
+          <a:p>
+            <a:r>
+              <a:rPr lang="en-US" sz="1200" dirty="0" smtClean="0">
+                <a:latin typeface="Lucida Sans Unicode" pitchFamily="34" charset="0"/>
+                <a:cs typeface="Lucida Sans Unicode" pitchFamily="34" charset="0"/>
+              </a:rPr>
+              <a:t>Phase: </a:t>
+            </a:r>
+            <a:r>
+              <a:rPr lang="en-US" sz="1200" dirty="0" err="1" smtClean="0">
+                <a:latin typeface="Lucida Sans Unicode" pitchFamily="34" charset="0"/>
+                <a:cs typeface="Lucida Sans Unicode" pitchFamily="34" charset="0"/>
+              </a:rPr>
+              <a:t>wmdelay</a:t>
+            </a:r>
+            <a:endParaRPr lang="en-US" sz="1200" dirty="0" smtClean="0">
+              <a:latin typeface="Lucida Sans Unicode" pitchFamily="34" charset="0"/>
+              <a:cs typeface="Lucida Sans Unicode" pitchFamily="34" charset="0"/>
+            </a:endParaRPr>
+          </a:p>
+          <a:p>
+            <a:r>
+              <a:rPr lang="en-US" sz="1200" dirty="0" err="1" smtClean="0">
+                <a:latin typeface="Lucida Sans Unicode" pitchFamily="34" charset="0"/>
+                <a:cs typeface="Lucida Sans Unicode" pitchFamily="34" charset="0"/>
+              </a:rPr>
+              <a:t>Dur</a:t>
+            </a:r>
+            <a:r>
+              <a:rPr lang="en-US" sz="1200" dirty="0" smtClean="0">
+                <a:latin typeface="Lucida Sans Unicode" pitchFamily="34" charset="0"/>
+                <a:cs typeface="Lucida Sans Unicode" pitchFamily="34" charset="0"/>
+              </a:rPr>
+              <a:t>:     3000 ms</a:t>
+            </a:r>
+          </a:p>
+          <a:p>
+            <a:endParaRPr lang="nl-NL" sz="1200" dirty="0">
+              <a:latin typeface="Lucida Sans Unicode" pitchFamily="34" charset="0"/>
+              <a:cs typeface="Lucida Sans Unicode" pitchFamily="34" charset="0"/>
+            </a:endParaRPr>
+          </a:p>
+        </p:txBody>
+      </p:sp>
+      <p:sp>
+        <p:nvSpPr>
+          <p:cNvPr id="32" name="Tekstvak 31"/>
+          <p:cNvSpPr txBox="1"/>
+          <p:nvPr/>
+        </p:nvSpPr>
+        <p:spPr>
+          <a:xfrm>
+            <a:off x="5004048" y="4725144"/>
+            <a:ext cx="2088232" cy="646331"/>
+          </a:xfrm>
+          <a:prstGeom prst="rect">
+            <a:avLst/>
+          </a:prstGeom>
+          <a:noFill/>
+        </p:spPr>
+        <p:txBody>
+          <a:bodyPr wrap="square" rtlCol="0">
+            <a:spAutoFit/>
+          </a:bodyPr>
+          <a:lstStyle/>
+          <a:p>
+            <a:r>
+              <a:rPr lang="en-US" sz="1200" dirty="0" smtClean="0">
+                <a:latin typeface="Lucida Sans Unicode" pitchFamily="34" charset="0"/>
+                <a:cs typeface="Lucida Sans Unicode" pitchFamily="34" charset="0"/>
+              </a:rPr>
+              <a:t>Phase: </a:t>
+            </a:r>
+            <a:r>
+              <a:rPr lang="en-US" sz="1200" dirty="0" err="1" smtClean="0">
+                <a:latin typeface="Lucida Sans Unicode" pitchFamily="34" charset="0"/>
+                <a:cs typeface="Lucida Sans Unicode" pitchFamily="34" charset="0"/>
+              </a:rPr>
+              <a:t>match_stim</a:t>
+            </a:r>
+            <a:endParaRPr lang="en-US" sz="1200" dirty="0" smtClean="0">
+              <a:latin typeface="Lucida Sans Unicode" pitchFamily="34" charset="0"/>
+              <a:cs typeface="Lucida Sans Unicode" pitchFamily="34" charset="0"/>
+            </a:endParaRPr>
+          </a:p>
+          <a:p>
+            <a:r>
+              <a:rPr lang="en-US" sz="1200" dirty="0" err="1" smtClean="0">
+                <a:latin typeface="Lucida Sans Unicode" pitchFamily="34" charset="0"/>
+                <a:cs typeface="Lucida Sans Unicode" pitchFamily="34" charset="0"/>
+              </a:rPr>
+              <a:t>Dur</a:t>
+            </a:r>
+            <a:r>
+              <a:rPr lang="en-US" sz="1200" dirty="0" smtClean="0">
+                <a:latin typeface="Lucida Sans Unicode" pitchFamily="34" charset="0"/>
+                <a:cs typeface="Lucida Sans Unicode" pitchFamily="34" charset="0"/>
+              </a:rPr>
+              <a:t>:     100 ms</a:t>
+            </a:r>
+          </a:p>
+          <a:p>
+            <a:endParaRPr lang="nl-NL" sz="1200" dirty="0">
+              <a:latin typeface="Lucida Sans Unicode" pitchFamily="34" charset="0"/>
+              <a:cs typeface="Lucida Sans Unicode" pitchFamily="34" charset="0"/>
+            </a:endParaRPr>
+          </a:p>
+        </p:txBody>
+      </p:sp>
+      <p:grpSp>
+        <p:nvGrpSpPr>
+          <p:cNvPr id="24" name="Groep 23"/>
+          <p:cNvGrpSpPr/>
+          <p:nvPr/>
+        </p:nvGrpSpPr>
+        <p:grpSpPr>
+          <a:xfrm>
+            <a:off x="3419872" y="1988840"/>
+            <a:ext cx="2304256" cy="2160240"/>
+            <a:chOff x="539552" y="1556792"/>
+            <a:chExt cx="2304256" cy="2160240"/>
+          </a:xfrm>
+        </p:grpSpPr>
+        <p:sp>
+          <p:nvSpPr>
+            <p:cNvPr id="25" name="Rechthoek 24"/>
+            <p:cNvSpPr/>
+            <p:nvPr/>
+          </p:nvSpPr>
+          <p:spPr>
+            <a:xfrm>
+              <a:off x="539552" y="1556792"/>
+              <a:ext cx="2304256" cy="2160240"/>
+            </a:xfrm>
+            <a:prstGeom prst="rect">
+              <a:avLst/>
+            </a:prstGeom>
+            <a:solidFill>
+              <a:schemeClr val="bg1">
+                <a:lumMod val="50000"/>
+              </a:schemeClr>
+            </a:solidFill>
+            <a:ln>
+              <a:solidFill>
+                <a:schemeClr val="tx1"/>
+              </a:solidFill>
+            </a:ln>
+          </p:spPr>
+          <p:style>
+            <a:lnRef idx="2">
+              <a:schemeClr val="accent1">
+                <a:shade val="50000"/>
+              </a:schemeClr>
+            </a:lnRef>
+            <a:fillRef idx="1">
+              <a:schemeClr val="accent1"/>
+            </a:fillRef>
+            <a:effectRef idx="0">
+              <a:schemeClr val="accent1"/>
+            </a:effectRef>
+            <a:fontRef idx="minor">
+              <a:schemeClr val="lt1"/>
+            </a:fontRef>
+          </p:style>
+          <p:txBody>
+            <a:bodyPr rtlCol="0" anchor="ctr"/>
+            <a:lstStyle/>
+            <a:p>
+              <a:pPr algn="ctr"/>
+              <a:endParaRPr lang="nl-NL"/>
+            </a:p>
+          </p:txBody>
+        </p:sp>
+        <p:grpSp>
+          <p:nvGrpSpPr>
+            <p:cNvPr id="26" name="Groep 10"/>
+            <p:cNvGrpSpPr/>
+            <p:nvPr/>
+          </p:nvGrpSpPr>
+          <p:grpSpPr>
+            <a:xfrm>
+              <a:off x="683568" y="1628800"/>
+              <a:ext cx="2016224" cy="2016224"/>
+              <a:chOff x="3347864" y="3645024"/>
+              <a:chExt cx="2016224" cy="2016224"/>
+            </a:xfrm>
+          </p:grpSpPr>
+          <p:sp>
+            <p:nvSpPr>
+              <p:cNvPr id="28" name="Koorde 27"/>
+              <p:cNvSpPr/>
+              <p:nvPr/>
+            </p:nvSpPr>
+            <p:spPr>
+              <a:xfrm>
+                <a:off x="3347864" y="3645024"/>
+                <a:ext cx="2016224" cy="2016224"/>
+              </a:xfrm>
+              <a:prstGeom prst="chord">
+                <a:avLst>
+                  <a:gd name="adj1" fmla="val 5387812"/>
+                  <a:gd name="adj2" fmla="val 16200000"/>
+                </a:avLst>
+              </a:prstGeom>
+              <a:solidFill>
+                <a:schemeClr val="tx1"/>
+              </a:solidFill>
+              <a:ln>
+                <a:noFill/>
+              </a:ln>
+            </p:spPr>
+            <p:style>
+              <a:lnRef idx="2">
+                <a:schemeClr val="accent1">
+                  <a:shade val="50000"/>
+                </a:schemeClr>
+              </a:lnRef>
+              <a:fillRef idx="1">
+                <a:schemeClr val="accent1"/>
+              </a:fillRef>
+              <a:effectRef idx="0">
+                <a:schemeClr val="accent1"/>
+              </a:effectRef>
+              <a:fontRef idx="minor">
+                <a:schemeClr val="lt1"/>
+              </a:fontRef>
+            </p:style>
+            <p:txBody>
+              <a:bodyPr rtlCol="0" anchor="ctr"/>
+              <a:lstStyle/>
+              <a:p>
+                <a:pPr algn="ctr"/>
+                <a:endParaRPr lang="nl-NL"/>
+              </a:p>
+            </p:txBody>
+          </p:sp>
+          <p:sp>
+            <p:nvSpPr>
+              <p:cNvPr id="29" name="Koorde 28"/>
+              <p:cNvSpPr/>
+              <p:nvPr/>
+            </p:nvSpPr>
+            <p:spPr>
+              <a:xfrm rot="10800000">
+                <a:off x="3347864" y="3645024"/>
+                <a:ext cx="2016224" cy="2016224"/>
+              </a:xfrm>
+              <a:prstGeom prst="chord">
+                <a:avLst>
+                  <a:gd name="adj1" fmla="val 5387812"/>
+                  <a:gd name="adj2" fmla="val 16200000"/>
+                </a:avLst>
+              </a:prstGeom>
+              <a:solidFill>
+                <a:schemeClr val="bg1"/>
+              </a:solidFill>
+              <a:ln>
+                <a:noFill/>
+              </a:ln>
+            </p:spPr>
+            <p:style>
+              <a:lnRef idx="2">
+                <a:schemeClr val="accent1">
+                  <a:shade val="50000"/>
+                </a:schemeClr>
+              </a:lnRef>
+              <a:fillRef idx="1">
+                <a:schemeClr val="accent1"/>
+              </a:fillRef>
+              <a:effectRef idx="0">
+                <a:schemeClr val="accent1"/>
+              </a:effectRef>
+              <a:fontRef idx="minor">
+                <a:schemeClr val="lt1"/>
+              </a:fontRef>
+            </p:style>
+            <p:txBody>
+              <a:bodyPr rtlCol="0" anchor="ctr"/>
+              <a:lstStyle/>
+              <a:p>
+                <a:pPr algn="ctr"/>
+                <a:endParaRPr lang="nl-NL"/>
+              </a:p>
+            </p:txBody>
+          </p:sp>
+          <p:sp>
+            <p:nvSpPr>
+              <p:cNvPr id="30" name="Ovaal 29"/>
+              <p:cNvSpPr/>
+              <p:nvPr/>
+            </p:nvSpPr>
+            <p:spPr>
+              <a:xfrm>
+                <a:off x="3851920" y="4149080"/>
+                <a:ext cx="1008112" cy="1008112"/>
+              </a:xfrm>
+              <a:prstGeom prst="ellipse">
+                <a:avLst/>
+              </a:prstGeom>
+              <a:solidFill>
+                <a:schemeClr val="bg1">
+                  <a:lumMod val="50000"/>
+                </a:schemeClr>
+              </a:solidFill>
+              <a:ln>
+                <a:noFill/>
+              </a:ln>
+            </p:spPr>
+            <p:style>
+              <a:lnRef idx="2">
+                <a:schemeClr val="accent1">
+                  <a:shade val="50000"/>
+                </a:schemeClr>
+              </a:lnRef>
+              <a:fillRef idx="1">
+                <a:schemeClr val="accent1"/>
+              </a:fillRef>
+              <a:effectRef idx="0">
+                <a:schemeClr val="accent1"/>
+              </a:effectRef>
+              <a:fontRef idx="minor">
+                <a:schemeClr val="lt1"/>
+              </a:fontRef>
+            </p:style>
+            <p:txBody>
+              <a:bodyPr rtlCol="0" anchor="ctr"/>
+              <a:lstStyle/>
+              <a:p>
+                <a:pPr algn="ctr"/>
+                <a:endParaRPr lang="nl-NL"/>
+              </a:p>
+            </p:txBody>
+          </p:sp>
+        </p:grpSp>
+        <p:sp>
+          <p:nvSpPr>
+            <p:cNvPr id="27" name="Ovaal 26"/>
+            <p:cNvSpPr/>
+            <p:nvPr/>
+          </p:nvSpPr>
+          <p:spPr>
+            <a:xfrm>
+              <a:off x="1642532" y="2587764"/>
+              <a:ext cx="98296" cy="98296"/>
+            </a:xfrm>
+            <a:prstGeom prst="ellipse">
+              <a:avLst/>
+            </a:prstGeom>
+            <a:solidFill>
+              <a:schemeClr val="bg1">
+                <a:lumMod val="50000"/>
+              </a:schemeClr>
+            </a:solidFill>
+            <a:ln w="63500">
+              <a:solidFill>
+                <a:srgbClr val="0000FF"/>
+              </a:solidFill>
+            </a:ln>
+          </p:spPr>
+          <p:style>
+            <a:lnRef idx="2">
+              <a:schemeClr val="accent1">
+                <a:shade val="50000"/>
+              </a:schemeClr>
+            </a:lnRef>
+            <a:fillRef idx="1">
+              <a:schemeClr val="accent1"/>
+            </a:fillRef>
+            <a:effectRef idx="0">
+              <a:schemeClr val="accent1"/>
+            </a:effectRef>
+            <a:fontRef idx="minor">
+              <a:schemeClr val="lt1"/>
+            </a:fontRef>
+          </p:style>
+          <p:txBody>
+            <a:bodyPr rtlCol="0" anchor="ctr"/>
+            <a:lstStyle/>
+            <a:p>
+              <a:pPr algn="ctr"/>
+              <a:endParaRPr lang="nl-NL"/>
+            </a:p>
+          </p:txBody>
+        </p:sp>
+      </p:grpSp>
+      <p:grpSp>
+        <p:nvGrpSpPr>
+          <p:cNvPr id="33" name="Groep 32"/>
+          <p:cNvGrpSpPr/>
+          <p:nvPr/>
+        </p:nvGrpSpPr>
+        <p:grpSpPr>
+          <a:xfrm>
+            <a:off x="5004048" y="2564904"/>
+            <a:ext cx="2304256" cy="2160240"/>
+            <a:chOff x="539552" y="1556792"/>
+            <a:chExt cx="2304256" cy="2160240"/>
+          </a:xfrm>
+        </p:grpSpPr>
+        <p:sp>
+          <p:nvSpPr>
+            <p:cNvPr id="34" name="Rechthoek 33"/>
+            <p:cNvSpPr/>
+            <p:nvPr/>
+          </p:nvSpPr>
+          <p:spPr>
+            <a:xfrm>
+              <a:off x="539552" y="1556792"/>
+              <a:ext cx="2304256" cy="2160240"/>
+            </a:xfrm>
+            <a:prstGeom prst="rect">
+              <a:avLst/>
+            </a:prstGeom>
+            <a:solidFill>
+              <a:schemeClr val="bg1">
+                <a:lumMod val="50000"/>
+              </a:schemeClr>
+            </a:solidFill>
+            <a:ln>
+              <a:solidFill>
+                <a:schemeClr val="tx1"/>
+              </a:solidFill>
+            </a:ln>
+          </p:spPr>
+          <p:style>
+            <a:lnRef idx="2">
+              <a:schemeClr val="accent1">
+                <a:shade val="50000"/>
+              </a:schemeClr>
+            </a:lnRef>
+            <a:fillRef idx="1">
+              <a:schemeClr val="accent1"/>
+            </a:fillRef>
+            <a:effectRef idx="0">
+              <a:schemeClr val="accent1"/>
+            </a:effectRef>
+            <a:fontRef idx="minor">
+              <a:schemeClr val="lt1"/>
+            </a:fontRef>
+          </p:style>
+          <p:txBody>
+            <a:bodyPr rtlCol="0" anchor="ctr"/>
+            <a:lstStyle/>
+            <a:p>
+              <a:pPr algn="ctr"/>
+              <a:endParaRPr lang="nl-NL"/>
+            </a:p>
+          </p:txBody>
+        </p:sp>
+        <p:grpSp>
+          <p:nvGrpSpPr>
+            <p:cNvPr id="35" name="Groep 10"/>
+            <p:cNvGrpSpPr/>
+            <p:nvPr/>
+          </p:nvGrpSpPr>
+          <p:grpSpPr>
+            <a:xfrm>
+              <a:off x="683568" y="1628800"/>
+              <a:ext cx="2016224" cy="2016224"/>
+              <a:chOff x="3347864" y="3645024"/>
+              <a:chExt cx="2016224" cy="2016224"/>
+            </a:xfrm>
+          </p:grpSpPr>
+          <p:sp>
+            <p:nvSpPr>
+              <p:cNvPr id="38" name="Koorde 37"/>
+              <p:cNvSpPr/>
+              <p:nvPr/>
+            </p:nvSpPr>
+            <p:spPr>
+              <a:xfrm>
+                <a:off x="3347864" y="3645024"/>
+                <a:ext cx="2016224" cy="2016224"/>
+              </a:xfrm>
+              <a:prstGeom prst="chord">
+                <a:avLst>
+                  <a:gd name="adj1" fmla="val 5387812"/>
+                  <a:gd name="adj2" fmla="val 16200000"/>
+                </a:avLst>
+              </a:prstGeom>
+              <a:solidFill>
+                <a:schemeClr val="tx1"/>
+              </a:solidFill>
+              <a:ln>
+                <a:noFill/>
+              </a:ln>
+            </p:spPr>
+            <p:style>
+              <a:lnRef idx="2">
+                <a:schemeClr val="accent1">
+                  <a:shade val="50000"/>
+                </a:schemeClr>
+              </a:lnRef>
+              <a:fillRef idx="1">
+                <a:schemeClr val="accent1"/>
+              </a:fillRef>
+              <a:effectRef idx="0">
+                <a:schemeClr val="accent1"/>
+              </a:effectRef>
+              <a:fontRef idx="minor">
+                <a:schemeClr val="lt1"/>
+              </a:fontRef>
+            </p:style>
+            <p:txBody>
+              <a:bodyPr rtlCol="0" anchor="ctr"/>
+              <a:lstStyle/>
+              <a:p>
+                <a:pPr algn="ctr"/>
+                <a:endParaRPr lang="nl-NL"/>
+              </a:p>
+            </p:txBody>
+          </p:sp>
+          <p:sp>
+            <p:nvSpPr>
+              <p:cNvPr id="39" name="Koorde 38"/>
+              <p:cNvSpPr/>
+              <p:nvPr/>
+            </p:nvSpPr>
+            <p:spPr>
+              <a:xfrm rot="10800000">
+                <a:off x="3347864" y="3645024"/>
+                <a:ext cx="2016224" cy="2016224"/>
+              </a:xfrm>
+              <a:prstGeom prst="chord">
+                <a:avLst>
+                  <a:gd name="adj1" fmla="val 5387812"/>
+                  <a:gd name="adj2" fmla="val 16200000"/>
+                </a:avLst>
+              </a:prstGeom>
+              <a:solidFill>
+                <a:schemeClr val="bg1"/>
+              </a:solidFill>
+              <a:ln>
+                <a:noFill/>
+              </a:ln>
+            </p:spPr>
+            <p:style>
+              <a:lnRef idx="2">
+                <a:schemeClr val="accent1">
+                  <a:shade val="50000"/>
+                </a:schemeClr>
+              </a:lnRef>
+              <a:fillRef idx="1">
+                <a:schemeClr val="accent1"/>
+              </a:fillRef>
+              <a:effectRef idx="0">
+                <a:schemeClr val="accent1"/>
+              </a:effectRef>
+              <a:fontRef idx="minor">
+                <a:schemeClr val="lt1"/>
+              </a:fontRef>
+            </p:style>
+            <p:txBody>
+              <a:bodyPr rtlCol="0" anchor="ctr"/>
+              <a:lstStyle/>
+              <a:p>
+                <a:pPr algn="ctr"/>
+                <a:endParaRPr lang="nl-NL"/>
+              </a:p>
+            </p:txBody>
+          </p:sp>
+          <p:sp>
+            <p:nvSpPr>
+              <p:cNvPr id="40" name="Ovaal 39"/>
+              <p:cNvSpPr/>
+              <p:nvPr/>
+            </p:nvSpPr>
+            <p:spPr>
+              <a:xfrm>
+                <a:off x="3851920" y="4149080"/>
+                <a:ext cx="1008112" cy="1008112"/>
+              </a:xfrm>
+              <a:prstGeom prst="ellipse">
+                <a:avLst/>
+              </a:prstGeom>
+              <a:solidFill>
+                <a:schemeClr val="bg1">
+                  <a:lumMod val="50000"/>
+                </a:schemeClr>
+              </a:solidFill>
+              <a:ln>
+                <a:noFill/>
+              </a:ln>
+            </p:spPr>
+            <p:style>
+              <a:lnRef idx="2">
+                <a:schemeClr val="accent1">
+                  <a:shade val="50000"/>
+                </a:schemeClr>
+              </a:lnRef>
+              <a:fillRef idx="1">
+                <a:schemeClr val="accent1"/>
+              </a:fillRef>
+              <a:effectRef idx="0">
+                <a:schemeClr val="accent1"/>
+              </a:effectRef>
+              <a:fontRef idx="minor">
+                <a:schemeClr val="lt1"/>
+              </a:fontRef>
+            </p:style>
+            <p:txBody>
+              <a:bodyPr rtlCol="0" anchor="ctr"/>
+              <a:lstStyle/>
+              <a:p>
+                <a:pPr algn="ctr"/>
+                <a:endParaRPr lang="nl-NL"/>
+              </a:p>
+            </p:txBody>
+          </p:sp>
+        </p:grpSp>
+        <p:sp>
+          <p:nvSpPr>
+            <p:cNvPr id="36" name="Ovaal 35"/>
+            <p:cNvSpPr/>
+            <p:nvPr/>
+          </p:nvSpPr>
+          <p:spPr>
+            <a:xfrm rot="4500000">
+              <a:off x="922586" y="2193277"/>
+              <a:ext cx="204618" cy="204618"/>
+            </a:xfrm>
+            <a:prstGeom prst="ellipse">
+              <a:avLst/>
+            </a:prstGeom>
+            <a:blipFill dpi="0" rotWithShape="1">
+              <a:blip r:embed="rId2" cstate="print"/>
+              <a:srcRect/>
+              <a:stretch>
+                <a:fillRect/>
+              </a:stretch>
+            </a:blipFill>
+            <a:ln>
+              <a:noFill/>
+            </a:ln>
+          </p:spPr>
+          <p:style>
+            <a:lnRef idx="2">
+              <a:schemeClr val="accent1">
+                <a:shade val="50000"/>
+              </a:schemeClr>
+            </a:lnRef>
+            <a:fillRef idx="1">
+              <a:schemeClr val="accent1"/>
+            </a:fillRef>
+            <a:effectRef idx="0">
+              <a:schemeClr val="accent1"/>
+            </a:effectRef>
+            <a:fontRef idx="minor">
+              <a:schemeClr val="lt1"/>
+            </a:fontRef>
+          </p:style>
+          <p:txBody>
+            <a:bodyPr rtlCol="0" anchor="ctr"/>
+            <a:lstStyle/>
+            <a:p>
+              <a:pPr algn="ctr"/>
+              <a:endParaRPr lang="nl-NL" sz="1400"/>
+            </a:p>
+          </p:txBody>
+        </p:sp>
+        <p:sp>
+          <p:nvSpPr>
+            <p:cNvPr id="37" name="Ovaal 36"/>
+            <p:cNvSpPr/>
+            <p:nvPr/>
+          </p:nvSpPr>
+          <p:spPr>
+            <a:xfrm>
+              <a:off x="1642532" y="2587764"/>
+              <a:ext cx="98296" cy="98296"/>
+            </a:xfrm>
+            <a:prstGeom prst="ellipse">
+              <a:avLst/>
+            </a:prstGeom>
+            <a:solidFill>
+              <a:schemeClr val="bg1">
+                <a:lumMod val="50000"/>
+              </a:schemeClr>
+            </a:solidFill>
+            <a:ln w="63500">
+              <a:solidFill>
+                <a:srgbClr val="0000FF"/>
+              </a:solidFill>
+            </a:ln>
+          </p:spPr>
+          <p:style>
+            <a:lnRef idx="2">
+              <a:schemeClr val="accent1">
+                <a:shade val="50000"/>
+              </a:schemeClr>
+            </a:lnRef>
+            <a:fillRef idx="1">
+              <a:schemeClr val="accent1"/>
+            </a:fillRef>
+            <a:effectRef idx="0">
+              <a:schemeClr val="accent1"/>
+            </a:effectRef>
+            <a:fontRef idx="minor">
+              <a:schemeClr val="lt1"/>
+            </a:fontRef>
+          </p:style>
+          <p:txBody>
+            <a:bodyPr rtlCol="0" anchor="ctr"/>
+            <a:lstStyle/>
+            <a:p>
+              <a:pPr algn="ctr"/>
+              <a:endParaRPr lang="nl-NL"/>
+            </a:p>
+          </p:txBody>
+        </p:sp>
+      </p:grpSp>
+      <p:grpSp>
+        <p:nvGrpSpPr>
+          <p:cNvPr id="41" name="Groep 40"/>
+          <p:cNvGrpSpPr/>
+          <p:nvPr/>
+        </p:nvGrpSpPr>
+        <p:grpSpPr>
+          <a:xfrm>
+            <a:off x="6588224" y="3429000"/>
+            <a:ext cx="2304256" cy="2160240"/>
+            <a:chOff x="539552" y="1556792"/>
+            <a:chExt cx="2304256" cy="2160240"/>
+          </a:xfrm>
+        </p:grpSpPr>
+        <p:sp>
+          <p:nvSpPr>
+            <p:cNvPr id="42" name="Rechthoek 41"/>
+            <p:cNvSpPr/>
+            <p:nvPr/>
+          </p:nvSpPr>
+          <p:spPr>
+            <a:xfrm>
+              <a:off x="539552" y="1556792"/>
+              <a:ext cx="2304256" cy="2160240"/>
+            </a:xfrm>
+            <a:prstGeom prst="rect">
+              <a:avLst/>
+            </a:prstGeom>
+            <a:solidFill>
+              <a:schemeClr val="bg1">
+                <a:lumMod val="50000"/>
+              </a:schemeClr>
+            </a:solidFill>
+            <a:ln>
+              <a:solidFill>
+                <a:schemeClr val="tx1"/>
+              </a:solidFill>
+            </a:ln>
+          </p:spPr>
+          <p:style>
+            <a:lnRef idx="2">
+              <a:schemeClr val="accent1">
+                <a:shade val="50000"/>
+              </a:schemeClr>
+            </a:lnRef>
+            <a:fillRef idx="1">
+              <a:schemeClr val="accent1"/>
+            </a:fillRef>
+            <a:effectRef idx="0">
+              <a:schemeClr val="accent1"/>
+            </a:effectRef>
+            <a:fontRef idx="minor">
+              <a:schemeClr val="lt1"/>
+            </a:fontRef>
+          </p:style>
+          <p:txBody>
+            <a:bodyPr rtlCol="0" anchor="ctr"/>
+            <a:lstStyle/>
+            <a:p>
+              <a:pPr algn="ctr"/>
+              <a:endParaRPr lang="nl-NL"/>
+            </a:p>
+          </p:txBody>
+        </p:sp>
+        <p:grpSp>
+          <p:nvGrpSpPr>
+            <p:cNvPr id="43" name="Groep 10"/>
+            <p:cNvGrpSpPr/>
+            <p:nvPr/>
+          </p:nvGrpSpPr>
+          <p:grpSpPr>
+            <a:xfrm>
+              <a:off x="683568" y="1628800"/>
+              <a:ext cx="2016224" cy="2016224"/>
+              <a:chOff x="3347864" y="3645024"/>
+              <a:chExt cx="2016224" cy="2016224"/>
+            </a:xfrm>
+          </p:grpSpPr>
+          <p:sp>
+            <p:nvSpPr>
+              <p:cNvPr id="45" name="Koorde 44"/>
+              <p:cNvSpPr/>
+              <p:nvPr/>
+            </p:nvSpPr>
+            <p:spPr>
+              <a:xfrm>
+                <a:off x="3347864" y="3645024"/>
+                <a:ext cx="2016224" cy="2016224"/>
+              </a:xfrm>
+              <a:prstGeom prst="chord">
+                <a:avLst>
+                  <a:gd name="adj1" fmla="val 5387812"/>
+                  <a:gd name="adj2" fmla="val 16200000"/>
+                </a:avLst>
+              </a:prstGeom>
+              <a:solidFill>
+                <a:schemeClr val="tx1"/>
+              </a:solidFill>
+              <a:ln>
+                <a:noFill/>
+              </a:ln>
+            </p:spPr>
+            <p:style>
+              <a:lnRef idx="2">
+                <a:schemeClr val="accent1">
+                  <a:shade val="50000"/>
+                </a:schemeClr>
+              </a:lnRef>
+              <a:fillRef idx="1">
+                <a:schemeClr val="accent1"/>
+              </a:fillRef>
+              <a:effectRef idx="0">
+                <a:schemeClr val="accent1"/>
+              </a:effectRef>
+              <a:fontRef idx="minor">
+                <a:schemeClr val="lt1"/>
+              </a:fontRef>
+            </p:style>
+            <p:txBody>
+              <a:bodyPr rtlCol="0" anchor="ctr"/>
+              <a:lstStyle/>
+              <a:p>
+                <a:pPr algn="ctr"/>
+                <a:endParaRPr lang="nl-NL"/>
+              </a:p>
+            </p:txBody>
+          </p:sp>
+          <p:sp>
+            <p:nvSpPr>
+              <p:cNvPr id="46" name="Koorde 45"/>
+              <p:cNvSpPr/>
+              <p:nvPr/>
+            </p:nvSpPr>
+            <p:spPr>
+              <a:xfrm rot="10800000">
+                <a:off x="3347864" y="3645024"/>
+                <a:ext cx="2016224" cy="2016224"/>
+              </a:xfrm>
+              <a:prstGeom prst="chord">
+                <a:avLst>
+                  <a:gd name="adj1" fmla="val 5387812"/>
+                  <a:gd name="adj2" fmla="val 16200000"/>
+                </a:avLst>
+              </a:prstGeom>
+              <a:solidFill>
+                <a:schemeClr val="bg1"/>
+              </a:solidFill>
+              <a:ln>
+                <a:noFill/>
+              </a:ln>
+            </p:spPr>
+            <p:style>
+              <a:lnRef idx="2">
+                <a:schemeClr val="accent1">
+                  <a:shade val="50000"/>
+                </a:schemeClr>
+              </a:lnRef>
+              <a:fillRef idx="1">
+                <a:schemeClr val="accent1"/>
+              </a:fillRef>
+              <a:effectRef idx="0">
+                <a:schemeClr val="accent1"/>
+              </a:effectRef>
+              <a:fontRef idx="minor">
+                <a:schemeClr val="lt1"/>
+              </a:fontRef>
+            </p:style>
+            <p:txBody>
+              <a:bodyPr rtlCol="0" anchor="ctr"/>
+              <a:lstStyle/>
+              <a:p>
+                <a:pPr algn="ctr"/>
+                <a:endParaRPr lang="nl-NL"/>
+              </a:p>
+            </p:txBody>
+          </p:sp>
+          <p:sp>
+            <p:nvSpPr>
+              <p:cNvPr id="47" name="Ovaal 46"/>
+              <p:cNvSpPr/>
+              <p:nvPr/>
+            </p:nvSpPr>
+            <p:spPr>
+              <a:xfrm>
+                <a:off x="3851920" y="4149080"/>
+                <a:ext cx="1008112" cy="1008112"/>
+              </a:xfrm>
+              <a:prstGeom prst="ellipse">
+                <a:avLst/>
+              </a:prstGeom>
+              <a:solidFill>
+                <a:schemeClr val="bg1">
+                  <a:lumMod val="50000"/>
+                </a:schemeClr>
+              </a:solidFill>
+              <a:ln>
+                <a:noFill/>
+              </a:ln>
+            </p:spPr>
+            <p:style>
+              <a:lnRef idx="2">
+                <a:schemeClr val="accent1">
+                  <a:shade val="50000"/>
+                </a:schemeClr>
+              </a:lnRef>
+              <a:fillRef idx="1">
+                <a:schemeClr val="accent1"/>
+              </a:fillRef>
+              <a:effectRef idx="0">
+                <a:schemeClr val="accent1"/>
+              </a:effectRef>
+              <a:fontRef idx="minor">
+                <a:schemeClr val="lt1"/>
+              </a:fontRef>
+            </p:style>
+            <p:txBody>
+              <a:bodyPr rtlCol="0" anchor="ctr"/>
+              <a:lstStyle/>
+              <a:p>
+                <a:pPr algn="ctr"/>
+                <a:endParaRPr lang="nl-NL"/>
+              </a:p>
+            </p:txBody>
+          </p:sp>
+        </p:grpSp>
+        <p:sp>
+          <p:nvSpPr>
+            <p:cNvPr id="44" name="Ovaal 43"/>
+            <p:cNvSpPr/>
+            <p:nvPr/>
+          </p:nvSpPr>
+          <p:spPr>
+            <a:xfrm>
+              <a:off x="1642532" y="2587764"/>
+              <a:ext cx="98296" cy="98296"/>
+            </a:xfrm>
+            <a:prstGeom prst="ellipse">
+              <a:avLst/>
+            </a:prstGeom>
+            <a:solidFill>
+              <a:schemeClr val="bg1">
+                <a:lumMod val="50000"/>
+              </a:schemeClr>
+            </a:solidFill>
+            <a:ln w="63500">
+              <a:solidFill>
+                <a:srgbClr val="0000FF"/>
+              </a:solidFill>
+            </a:ln>
+          </p:spPr>
+          <p:style>
+            <a:lnRef idx="2">
+              <a:schemeClr val="accent1">
+                <a:shade val="50000"/>
+              </a:schemeClr>
+            </a:lnRef>
+            <a:fillRef idx="1">
+              <a:schemeClr val="accent1"/>
+            </a:fillRef>
+            <a:effectRef idx="0">
+              <a:schemeClr val="accent1"/>
+            </a:effectRef>
+            <a:fontRef idx="minor">
+              <a:schemeClr val="lt1"/>
+            </a:fontRef>
+          </p:style>
+          <p:txBody>
+            <a:bodyPr rtlCol="0" anchor="ctr"/>
+            <a:lstStyle/>
+            <a:p>
+              <a:pPr algn="ctr"/>
+              <a:endParaRPr lang="nl-NL"/>
+            </a:p>
+          </p:txBody>
+        </p:sp>
+      </p:grpSp>
+      <p:sp>
+        <p:nvSpPr>
+          <p:cNvPr id="48" name="Tekstvak 47"/>
+          <p:cNvSpPr txBox="1"/>
+          <p:nvPr/>
+        </p:nvSpPr>
+        <p:spPr>
+          <a:xfrm>
+            <a:off x="6588224" y="5589240"/>
+            <a:ext cx="1872208" cy="646331"/>
+          </a:xfrm>
+          <a:prstGeom prst="rect">
+            <a:avLst/>
+          </a:prstGeom>
+          <a:noFill/>
+        </p:spPr>
+        <p:txBody>
+          <a:bodyPr wrap="square" rtlCol="0">
+            <a:spAutoFit/>
+          </a:bodyPr>
+          <a:lstStyle/>
+          <a:p>
+            <a:r>
+              <a:rPr lang="en-US" sz="1200" dirty="0" smtClean="0">
+                <a:latin typeface="Lucida Sans Unicode" pitchFamily="34" charset="0"/>
+                <a:cs typeface="Lucida Sans Unicode" pitchFamily="34" charset="0"/>
+              </a:rPr>
+              <a:t>Phase: </a:t>
+            </a:r>
+            <a:r>
+              <a:rPr lang="en-US" sz="1200" dirty="0" err="1" smtClean="0">
+                <a:latin typeface="Lucida Sans Unicode" pitchFamily="34" charset="0"/>
+                <a:cs typeface="Lucida Sans Unicode" pitchFamily="34" charset="0"/>
+              </a:rPr>
+              <a:t>respwin</a:t>
+            </a:r>
+            <a:endParaRPr lang="en-US" sz="1200" dirty="0" smtClean="0">
+              <a:latin typeface="Lucida Sans Unicode" pitchFamily="34" charset="0"/>
+              <a:cs typeface="Lucida Sans Unicode" pitchFamily="34" charset="0"/>
+            </a:endParaRPr>
+          </a:p>
+          <a:p>
+            <a:r>
+              <a:rPr lang="en-US" sz="1200" dirty="0" err="1" smtClean="0">
+                <a:latin typeface="Lucida Sans Unicode" pitchFamily="34" charset="0"/>
+                <a:cs typeface="Lucida Sans Unicode" pitchFamily="34" charset="0"/>
+              </a:rPr>
+              <a:t>Dur</a:t>
+            </a:r>
+            <a:r>
+              <a:rPr lang="en-US" sz="1200" dirty="0" smtClean="0">
+                <a:latin typeface="Lucida Sans Unicode" pitchFamily="34" charset="0"/>
+                <a:cs typeface="Lucida Sans Unicode" pitchFamily="34" charset="0"/>
+              </a:rPr>
+              <a:t>:    </a:t>
+            </a:r>
+            <a:r>
+              <a:rPr lang="en-US" sz="1200" smtClean="0">
+                <a:latin typeface="Lucida Sans Unicode" pitchFamily="34" charset="0"/>
+                <a:cs typeface="Lucida Sans Unicode" pitchFamily="34" charset="0"/>
+              </a:rPr>
+              <a:t>Inf</a:t>
+            </a:r>
+            <a:endParaRPr lang="en-US" sz="1200" dirty="0" smtClean="0">
+              <a:latin typeface="Lucida Sans Unicode" pitchFamily="34" charset="0"/>
+              <a:cs typeface="Lucida Sans Unicode" pitchFamily="34" charset="0"/>
+            </a:endParaRPr>
+          </a:p>
+          <a:p>
+            <a:endParaRPr lang="nl-NL" sz="1200" dirty="0">
+              <a:latin typeface="Lucida Sans Unicode" pitchFamily="34" charset="0"/>
+              <a:cs typeface="Lucida Sans Unicode" pitchFamily="34" charset="0"/>
+            </a:endParaRPr>
+          </a:p>
+        </p:txBody>
+      </p:sp>
     </p:spTree>
   </p:cSld>
   <p:clrMapOvr>

</xml_diff>